<commit_message>
[ll] board outputs for fab
</commit_message>
<xml_diff>
--- a/board/bond_diagram.pptx
+++ b/board/bond_diagram.pptx
@@ -5,7 +5,7 @@
     <p:sldMasterId id="2147483648" r:id="rId1"/>
   </p:sldMasterIdLst>
   <p:sldIdLst>
-    <p:sldId id="257" r:id="rId2"/>
+    <p:sldId id="258" r:id="rId2"/>
   </p:sldIdLst>
   <p:sldSz cx="12192000" cy="6858000"/>
   <p:notesSz cx="6858000" cy="9144000"/>
@@ -104,6 +104,11 @@
       </a:defRPr>
     </a:lvl9pPr>
   </p:defaultTextStyle>
+  <p:extLst>
+    <p:ext uri="{EFAFB233-063F-42B5-8137-9DF3F51BA10A}">
+      <p15:sldGuideLst xmlns:p15="http://schemas.microsoft.com/office/powerpoint/2012/main"/>
+    </p:ext>
+  </p:extLst>
 </p:presentation>
 </file>
 
@@ -238,7 +243,7 @@
           <a:p>
             <a:fld id="{CE8815F7-000F-4B7A-A68F-1FD32D3C63AD}" type="datetimeFigureOut">
               <a:rPr lang="en-US" smtClean="0"/>
-              <a:t>2023-03-01</a:t>
+              <a:t>2023-03-14</a:t>
             </a:fld>
             <a:endParaRPr lang="en-US"/>
           </a:p>
@@ -408,7 +413,7 @@
           <a:p>
             <a:fld id="{CE8815F7-000F-4B7A-A68F-1FD32D3C63AD}" type="datetimeFigureOut">
               <a:rPr lang="en-US" smtClean="0"/>
-              <a:t>2023-03-01</a:t>
+              <a:t>2023-03-14</a:t>
             </a:fld>
             <a:endParaRPr lang="en-US"/>
           </a:p>
@@ -588,7 +593,7 @@
           <a:p>
             <a:fld id="{CE8815F7-000F-4B7A-A68F-1FD32D3C63AD}" type="datetimeFigureOut">
               <a:rPr lang="en-US" smtClean="0"/>
-              <a:t>2023-03-01</a:t>
+              <a:t>2023-03-14</a:t>
             </a:fld>
             <a:endParaRPr lang="en-US"/>
           </a:p>
@@ -758,7 +763,7 @@
           <a:p>
             <a:fld id="{CE8815F7-000F-4B7A-A68F-1FD32D3C63AD}" type="datetimeFigureOut">
               <a:rPr lang="en-US" smtClean="0"/>
-              <a:t>2023-03-01</a:t>
+              <a:t>2023-03-14</a:t>
             </a:fld>
             <a:endParaRPr lang="en-US"/>
           </a:p>
@@ -1004,7 +1009,7 @@
           <a:p>
             <a:fld id="{CE8815F7-000F-4B7A-A68F-1FD32D3C63AD}" type="datetimeFigureOut">
               <a:rPr lang="en-US" smtClean="0"/>
-              <a:t>2023-03-01</a:t>
+              <a:t>2023-03-14</a:t>
             </a:fld>
             <a:endParaRPr lang="en-US"/>
           </a:p>
@@ -1236,7 +1241,7 @@
           <a:p>
             <a:fld id="{CE8815F7-000F-4B7A-A68F-1FD32D3C63AD}" type="datetimeFigureOut">
               <a:rPr lang="en-US" smtClean="0"/>
-              <a:t>2023-03-01</a:t>
+              <a:t>2023-03-14</a:t>
             </a:fld>
             <a:endParaRPr lang="en-US"/>
           </a:p>
@@ -1603,7 +1608,7 @@
           <a:p>
             <a:fld id="{CE8815F7-000F-4B7A-A68F-1FD32D3C63AD}" type="datetimeFigureOut">
               <a:rPr lang="en-US" smtClean="0"/>
-              <a:t>2023-03-01</a:t>
+              <a:t>2023-03-14</a:t>
             </a:fld>
             <a:endParaRPr lang="en-US"/>
           </a:p>
@@ -1721,7 +1726,7 @@
           <a:p>
             <a:fld id="{CE8815F7-000F-4B7A-A68F-1FD32D3C63AD}" type="datetimeFigureOut">
               <a:rPr lang="en-US" smtClean="0"/>
-              <a:t>2023-03-01</a:t>
+              <a:t>2023-03-14</a:t>
             </a:fld>
             <a:endParaRPr lang="en-US"/>
           </a:p>
@@ -1816,7 +1821,7 @@
           <a:p>
             <a:fld id="{CE8815F7-000F-4B7A-A68F-1FD32D3C63AD}" type="datetimeFigureOut">
               <a:rPr lang="en-US" smtClean="0"/>
-              <a:t>2023-03-01</a:t>
+              <a:t>2023-03-14</a:t>
             </a:fld>
             <a:endParaRPr lang="en-US"/>
           </a:p>
@@ -2093,7 +2098,7 @@
           <a:p>
             <a:fld id="{CE8815F7-000F-4B7A-A68F-1FD32D3C63AD}" type="datetimeFigureOut">
               <a:rPr lang="en-US" smtClean="0"/>
-              <a:t>2023-03-01</a:t>
+              <a:t>2023-03-14</a:t>
             </a:fld>
             <a:endParaRPr lang="en-US"/>
           </a:p>
@@ -2346,7 +2351,7 @@
           <a:p>
             <a:fld id="{CE8815F7-000F-4B7A-A68F-1FD32D3C63AD}" type="datetimeFigureOut">
               <a:rPr lang="en-US" smtClean="0"/>
-              <a:t>2023-03-01</a:t>
+              <a:t>2023-03-14</a:t>
             </a:fld>
             <a:endParaRPr lang="en-US"/>
           </a:p>
@@ -2559,7 +2564,7 @@
           <a:p>
             <a:fld id="{CE8815F7-000F-4B7A-A68F-1FD32D3C63AD}" type="datetimeFigureOut">
               <a:rPr lang="en-US" smtClean="0"/>
-              <a:t>2023-03-01</a:t>
+              <a:t>2023-03-14</a:t>
             </a:fld>
             <a:endParaRPr lang="en-US"/>
           </a:p>
@@ -2964,1629 +2969,1667 @@
           <a:chExt cx="0" cy="0"/>
         </a:xfrm>
       </p:grpSpPr>
-      <p:grpSp>
-        <p:nvGrpSpPr>
-          <p:cNvPr id="2" name="Group 1"/>
-          <p:cNvGrpSpPr>
-            <a:grpSpLocks noChangeAspect="1"/>
-          </p:cNvGrpSpPr>
+      <p:pic>
+        <p:nvPicPr>
+          <p:cNvPr id="5" name="Picture 4"/>
+          <p:cNvPicPr>
+            <a:picLocks noChangeAspect="1"/>
+          </p:cNvPicPr>
           <p:nvPr/>
-        </p:nvGrpSpPr>
-        <p:grpSpPr>
+        </p:nvPicPr>
+        <p:blipFill>
+          <a:blip r:embed="rId2"/>
+          <a:stretch>
+            <a:fillRect/>
+          </a:stretch>
+        </p:blipFill>
+        <p:spPr>
           <a:xfrm>
-            <a:off x="3357948" y="685800"/>
-            <a:ext cx="5476106" cy="5486398"/>
-            <a:chOff x="2310871" y="390673"/>
-            <a:chExt cx="4070879" cy="4078531"/>
-          </a:xfrm>
-        </p:grpSpPr>
-        <p:pic>
-          <p:nvPicPr>
-            <p:cNvPr id="3" name="Picture 2"/>
-            <p:cNvPicPr>
-              <a:picLocks noChangeAspect="1"/>
-            </p:cNvPicPr>
-            <p:nvPr/>
-          </p:nvPicPr>
-          <p:blipFill>
-            <a:blip r:embed="rId2"/>
-            <a:stretch>
-              <a:fillRect/>
-            </a:stretch>
-          </p:blipFill>
-          <p:spPr>
-            <a:xfrm>
-              <a:off x="2310871" y="390673"/>
-              <a:ext cx="4070879" cy="4078531"/>
-            </a:xfrm>
-            <a:prstGeom prst="rect">
-              <a:avLst/>
-            </a:prstGeom>
-            <a:ln w="28575">
-              <a:noFill/>
-            </a:ln>
-          </p:spPr>
-        </p:pic>
-        <p:cxnSp>
-          <p:nvCxnSpPr>
-            <p:cNvPr id="6" name="Straight Connector 5"/>
-            <p:cNvCxnSpPr/>
-            <p:nvPr/>
-          </p:nvCxnSpPr>
-          <p:spPr>
-            <a:xfrm flipV="1">
-              <a:off x="4838212" y="976874"/>
-              <a:ext cx="1181588" cy="1055028"/>
-            </a:xfrm>
-            <a:prstGeom prst="line">
-              <a:avLst/>
-            </a:prstGeom>
-            <a:ln w="28575">
-              <a:solidFill>
-                <a:srgbClr val="FF0000"/>
-              </a:solidFill>
-            </a:ln>
-          </p:spPr>
-          <p:style>
-            <a:lnRef idx="1">
-              <a:schemeClr val="accent1"/>
-            </a:lnRef>
-            <a:fillRef idx="0">
-              <a:schemeClr val="accent1"/>
-            </a:fillRef>
-            <a:effectRef idx="0">
-              <a:schemeClr val="accent1"/>
-            </a:effectRef>
-            <a:fontRef idx="minor">
-              <a:schemeClr val="tx1"/>
-            </a:fontRef>
-          </p:style>
-        </p:cxnSp>
-        <p:cxnSp>
-          <p:nvCxnSpPr>
-            <p:cNvPr id="7" name="Straight Connector 6"/>
-            <p:cNvCxnSpPr/>
-            <p:nvPr/>
-          </p:nvCxnSpPr>
-          <p:spPr>
-            <a:xfrm flipV="1">
-              <a:off x="4857750" y="1167588"/>
-              <a:ext cx="1181588" cy="929342"/>
-            </a:xfrm>
-            <a:prstGeom prst="line">
-              <a:avLst/>
-            </a:prstGeom>
-            <a:ln w="28575">
-              <a:solidFill>
-                <a:srgbClr val="FF0000"/>
-              </a:solidFill>
-            </a:ln>
-          </p:spPr>
-          <p:style>
-            <a:lnRef idx="1">
-              <a:schemeClr val="accent1"/>
-            </a:lnRef>
-            <a:fillRef idx="0">
-              <a:schemeClr val="accent1"/>
-            </a:fillRef>
-            <a:effectRef idx="0">
-              <a:schemeClr val="accent1"/>
-            </a:effectRef>
-            <a:fontRef idx="minor">
-              <a:schemeClr val="tx1"/>
-            </a:fontRef>
-          </p:style>
-        </p:cxnSp>
-        <p:cxnSp>
-          <p:nvCxnSpPr>
-            <p:cNvPr id="8" name="Straight Connector 7"/>
-            <p:cNvCxnSpPr/>
-            <p:nvPr/>
-          </p:nvCxnSpPr>
-          <p:spPr>
-            <a:xfrm flipV="1">
-              <a:off x="4857750" y="1378370"/>
-              <a:ext cx="1190625" cy="765943"/>
-            </a:xfrm>
-            <a:prstGeom prst="line">
-              <a:avLst/>
-            </a:prstGeom>
-            <a:ln w="28575">
-              <a:solidFill>
-                <a:srgbClr val="FF0000"/>
-              </a:solidFill>
-            </a:ln>
-          </p:spPr>
-          <p:style>
-            <a:lnRef idx="1">
-              <a:schemeClr val="accent1"/>
-            </a:lnRef>
-            <a:fillRef idx="0">
-              <a:schemeClr val="accent1"/>
-            </a:fillRef>
-            <a:effectRef idx="0">
-              <a:schemeClr val="accent1"/>
-            </a:effectRef>
-            <a:fontRef idx="minor">
-              <a:schemeClr val="tx1"/>
-            </a:fontRef>
-          </p:style>
-        </p:cxnSp>
-        <p:cxnSp>
-          <p:nvCxnSpPr>
-            <p:cNvPr id="9" name="Straight Connector 8"/>
-            <p:cNvCxnSpPr/>
-            <p:nvPr/>
-          </p:nvCxnSpPr>
-          <p:spPr>
-            <a:xfrm flipV="1">
-              <a:off x="4838212" y="1630591"/>
-              <a:ext cx="1210163" cy="598744"/>
-            </a:xfrm>
-            <a:prstGeom prst="line">
-              <a:avLst/>
-            </a:prstGeom>
-            <a:ln w="28575">
-              <a:solidFill>
-                <a:srgbClr val="FF0000"/>
-              </a:solidFill>
-            </a:ln>
-          </p:spPr>
-          <p:style>
-            <a:lnRef idx="1">
-              <a:schemeClr val="accent1"/>
-            </a:lnRef>
-            <a:fillRef idx="0">
-              <a:schemeClr val="accent1"/>
-            </a:fillRef>
-            <a:effectRef idx="0">
-              <a:schemeClr val="accent1"/>
-            </a:effectRef>
-            <a:fontRef idx="minor">
-              <a:schemeClr val="tx1"/>
-            </a:fontRef>
-          </p:style>
-        </p:cxnSp>
-        <p:cxnSp>
-          <p:nvCxnSpPr>
-            <p:cNvPr id="10" name="Straight Connector 9"/>
-            <p:cNvCxnSpPr/>
-            <p:nvPr/>
-          </p:nvCxnSpPr>
-          <p:spPr>
-            <a:xfrm flipV="1">
-              <a:off x="4857750" y="1838440"/>
-              <a:ext cx="1181588" cy="458274"/>
-            </a:xfrm>
-            <a:prstGeom prst="line">
-              <a:avLst/>
-            </a:prstGeom>
-            <a:ln w="28575">
-              <a:solidFill>
-                <a:srgbClr val="FF0000"/>
-              </a:solidFill>
-            </a:ln>
-          </p:spPr>
-          <p:style>
-            <a:lnRef idx="1">
-              <a:schemeClr val="accent1"/>
-            </a:lnRef>
-            <a:fillRef idx="0">
-              <a:schemeClr val="accent1"/>
-            </a:fillRef>
-            <a:effectRef idx="0">
-              <a:schemeClr val="accent1"/>
-            </a:effectRef>
-            <a:fontRef idx="minor">
-              <a:schemeClr val="tx1"/>
-            </a:fontRef>
-          </p:style>
-        </p:cxnSp>
-        <p:cxnSp>
-          <p:nvCxnSpPr>
-            <p:cNvPr id="11" name="Straight Connector 10"/>
-            <p:cNvCxnSpPr/>
-            <p:nvPr/>
-          </p:nvCxnSpPr>
-          <p:spPr>
-            <a:xfrm flipV="1">
-              <a:off x="4857750" y="2080321"/>
-              <a:ext cx="1162050" cy="273783"/>
-            </a:xfrm>
-            <a:prstGeom prst="line">
-              <a:avLst/>
-            </a:prstGeom>
-            <a:ln w="28575">
-              <a:solidFill>
-                <a:srgbClr val="FF0000"/>
-              </a:solidFill>
-            </a:ln>
-          </p:spPr>
-          <p:style>
-            <a:lnRef idx="1">
-              <a:schemeClr val="accent1"/>
-            </a:lnRef>
-            <a:fillRef idx="0">
-              <a:schemeClr val="accent1"/>
-            </a:fillRef>
-            <a:effectRef idx="0">
-              <a:schemeClr val="accent1"/>
-            </a:effectRef>
-            <a:fontRef idx="minor">
-              <a:schemeClr val="tx1"/>
-            </a:fontRef>
-          </p:style>
-        </p:cxnSp>
-        <p:cxnSp>
-          <p:nvCxnSpPr>
-            <p:cNvPr id="12" name="Straight Connector 11"/>
-            <p:cNvCxnSpPr/>
-            <p:nvPr/>
-          </p:nvCxnSpPr>
-          <p:spPr>
-            <a:xfrm flipV="1">
-              <a:off x="4857750" y="2311654"/>
-              <a:ext cx="1181588" cy="109949"/>
-            </a:xfrm>
-            <a:prstGeom prst="line">
-              <a:avLst/>
-            </a:prstGeom>
-            <a:ln w="28575">
-              <a:solidFill>
-                <a:srgbClr val="FF0000"/>
-              </a:solidFill>
-            </a:ln>
-          </p:spPr>
-          <p:style>
-            <a:lnRef idx="1">
-              <a:schemeClr val="accent1"/>
-            </a:lnRef>
-            <a:fillRef idx="0">
-              <a:schemeClr val="accent1"/>
-            </a:fillRef>
-            <a:effectRef idx="0">
-              <a:schemeClr val="accent1"/>
-            </a:effectRef>
-            <a:fontRef idx="minor">
-              <a:schemeClr val="tx1"/>
-            </a:fontRef>
-          </p:style>
-        </p:cxnSp>
-        <p:cxnSp>
-          <p:nvCxnSpPr>
-            <p:cNvPr id="13" name="Straight Connector 12"/>
-            <p:cNvCxnSpPr/>
-            <p:nvPr/>
-          </p:nvCxnSpPr>
-          <p:spPr>
-            <a:xfrm>
-              <a:off x="4838212" y="2489103"/>
-              <a:ext cx="1181588" cy="37932"/>
-            </a:xfrm>
-            <a:prstGeom prst="line">
-              <a:avLst/>
-            </a:prstGeom>
-            <a:ln w="28575">
-              <a:solidFill>
-                <a:srgbClr val="FF0000"/>
-              </a:solidFill>
-            </a:ln>
-          </p:spPr>
-          <p:style>
-            <a:lnRef idx="1">
-              <a:schemeClr val="accent1"/>
-            </a:lnRef>
-            <a:fillRef idx="0">
-              <a:schemeClr val="accent1"/>
-            </a:fillRef>
-            <a:effectRef idx="0">
-              <a:schemeClr val="accent1"/>
-            </a:effectRef>
-            <a:fontRef idx="minor">
-              <a:schemeClr val="tx1"/>
-            </a:fontRef>
-          </p:style>
-        </p:cxnSp>
-        <p:cxnSp>
-          <p:nvCxnSpPr>
-            <p:cNvPr id="14" name="Straight Connector 13"/>
-            <p:cNvCxnSpPr/>
-            <p:nvPr/>
-          </p:nvCxnSpPr>
-          <p:spPr>
-            <a:xfrm>
-              <a:off x="4857750" y="2556602"/>
-              <a:ext cx="1162050" cy="215382"/>
-            </a:xfrm>
-            <a:prstGeom prst="line">
-              <a:avLst/>
-            </a:prstGeom>
-            <a:ln w="28575">
-              <a:solidFill>
-                <a:srgbClr val="FF0000"/>
-              </a:solidFill>
-            </a:ln>
-          </p:spPr>
-          <p:style>
-            <a:lnRef idx="1">
-              <a:schemeClr val="accent1"/>
-            </a:lnRef>
-            <a:fillRef idx="0">
-              <a:schemeClr val="accent1"/>
-            </a:fillRef>
-            <a:effectRef idx="0">
-              <a:schemeClr val="accent1"/>
-            </a:effectRef>
-            <a:fontRef idx="minor">
-              <a:schemeClr val="tx1"/>
-            </a:fontRef>
-          </p:style>
-        </p:cxnSp>
-        <p:cxnSp>
-          <p:nvCxnSpPr>
-            <p:cNvPr id="15" name="Straight Connector 14"/>
-            <p:cNvCxnSpPr/>
-            <p:nvPr/>
-          </p:nvCxnSpPr>
-          <p:spPr>
-            <a:xfrm>
-              <a:off x="4838212" y="2624102"/>
-              <a:ext cx="1210163" cy="367233"/>
-            </a:xfrm>
-            <a:prstGeom prst="line">
-              <a:avLst/>
-            </a:prstGeom>
-            <a:ln w="28575">
-              <a:solidFill>
-                <a:srgbClr val="FF0000"/>
-              </a:solidFill>
-            </a:ln>
-          </p:spPr>
-          <p:style>
-            <a:lnRef idx="1">
-              <a:schemeClr val="accent1"/>
-            </a:lnRef>
-            <a:fillRef idx="0">
-              <a:schemeClr val="accent1"/>
-            </a:fillRef>
-            <a:effectRef idx="0">
-              <a:schemeClr val="accent1"/>
-            </a:effectRef>
-            <a:fontRef idx="minor">
-              <a:schemeClr val="tx1"/>
-            </a:fontRef>
-          </p:style>
-        </p:cxnSp>
-        <p:cxnSp>
-          <p:nvCxnSpPr>
-            <p:cNvPr id="16" name="Straight Connector 15"/>
-            <p:cNvCxnSpPr/>
-            <p:nvPr/>
-          </p:nvCxnSpPr>
-          <p:spPr>
-            <a:xfrm>
-              <a:off x="4857750" y="2677285"/>
-              <a:ext cx="1190625" cy="546187"/>
-            </a:xfrm>
-            <a:prstGeom prst="line">
-              <a:avLst/>
-            </a:prstGeom>
-            <a:ln w="28575">
-              <a:solidFill>
-                <a:srgbClr val="FF0000"/>
-              </a:solidFill>
-            </a:ln>
-          </p:spPr>
-          <p:style>
-            <a:lnRef idx="1">
-              <a:schemeClr val="accent1"/>
-            </a:lnRef>
-            <a:fillRef idx="0">
-              <a:schemeClr val="accent1"/>
-            </a:fillRef>
-            <a:effectRef idx="0">
-              <a:schemeClr val="accent1"/>
-            </a:effectRef>
-            <a:fontRef idx="minor">
-              <a:schemeClr val="tx1"/>
-            </a:fontRef>
-          </p:style>
-        </p:cxnSp>
-        <p:cxnSp>
-          <p:nvCxnSpPr>
-            <p:cNvPr id="17" name="Straight Connector 16"/>
-            <p:cNvCxnSpPr/>
-            <p:nvPr/>
-          </p:nvCxnSpPr>
-          <p:spPr>
-            <a:xfrm>
-              <a:off x="4838212" y="2748871"/>
-              <a:ext cx="1181588" cy="682030"/>
-            </a:xfrm>
-            <a:prstGeom prst="line">
-              <a:avLst/>
-            </a:prstGeom>
-            <a:ln w="28575">
-              <a:solidFill>
-                <a:srgbClr val="FF0000"/>
-              </a:solidFill>
-            </a:ln>
-          </p:spPr>
-          <p:style>
-            <a:lnRef idx="1">
-              <a:schemeClr val="accent1"/>
-            </a:lnRef>
-            <a:fillRef idx="0">
-              <a:schemeClr val="accent1"/>
-            </a:fillRef>
-            <a:effectRef idx="0">
-              <a:schemeClr val="accent1"/>
-            </a:effectRef>
-            <a:fontRef idx="minor">
-              <a:schemeClr val="tx1"/>
-            </a:fontRef>
-          </p:style>
-        </p:cxnSp>
-        <p:cxnSp>
-          <p:nvCxnSpPr>
-            <p:cNvPr id="18" name="Straight Connector 17"/>
-            <p:cNvCxnSpPr/>
-            <p:nvPr/>
-          </p:nvCxnSpPr>
-          <p:spPr>
-            <a:xfrm>
-              <a:off x="4857750" y="2793903"/>
-              <a:ext cx="1162050" cy="848395"/>
-            </a:xfrm>
-            <a:prstGeom prst="line">
-              <a:avLst/>
-            </a:prstGeom>
-            <a:ln w="28575">
-              <a:solidFill>
-                <a:srgbClr val="FF0000"/>
-              </a:solidFill>
-            </a:ln>
-          </p:spPr>
-          <p:style>
-            <a:lnRef idx="1">
-              <a:schemeClr val="accent1"/>
-            </a:lnRef>
-            <a:fillRef idx="0">
-              <a:schemeClr val="accent1"/>
-            </a:fillRef>
-            <a:effectRef idx="0">
-              <a:schemeClr val="accent1"/>
-            </a:effectRef>
-            <a:fontRef idx="minor">
-              <a:schemeClr val="tx1"/>
-            </a:fontRef>
-          </p:style>
-        </p:cxnSp>
-        <p:cxnSp>
-          <p:nvCxnSpPr>
-            <p:cNvPr id="19" name="Straight Connector 18"/>
-            <p:cNvCxnSpPr/>
-            <p:nvPr/>
-          </p:nvCxnSpPr>
-          <p:spPr>
-            <a:xfrm>
-              <a:off x="4838212" y="2869553"/>
-              <a:ext cx="1181588" cy="1004582"/>
-            </a:xfrm>
-            <a:prstGeom prst="line">
-              <a:avLst/>
-            </a:prstGeom>
-            <a:ln w="28575">
-              <a:solidFill>
-                <a:srgbClr val="FF0000"/>
-              </a:solidFill>
-            </a:ln>
-          </p:spPr>
-          <p:style>
-            <a:lnRef idx="1">
-              <a:schemeClr val="accent1"/>
-            </a:lnRef>
-            <a:fillRef idx="0">
-              <a:schemeClr val="accent1"/>
-            </a:fillRef>
-            <a:effectRef idx="0">
-              <a:schemeClr val="accent1"/>
-            </a:effectRef>
-            <a:fontRef idx="minor">
-              <a:schemeClr val="tx1"/>
-            </a:fontRef>
-          </p:style>
-        </p:cxnSp>
-        <p:cxnSp>
-          <p:nvCxnSpPr>
-            <p:cNvPr id="20" name="Straight Connector 19"/>
-            <p:cNvCxnSpPr/>
-            <p:nvPr/>
-          </p:nvCxnSpPr>
-          <p:spPr>
-            <a:xfrm>
-              <a:off x="4809637" y="2942798"/>
-              <a:ext cx="972038" cy="1128578"/>
-            </a:xfrm>
-            <a:prstGeom prst="line">
-              <a:avLst/>
-            </a:prstGeom>
-            <a:ln w="28575">
-              <a:solidFill>
-                <a:srgbClr val="FF0000"/>
-              </a:solidFill>
-            </a:ln>
-          </p:spPr>
-          <p:style>
-            <a:lnRef idx="1">
-              <a:schemeClr val="accent1"/>
-            </a:lnRef>
-            <a:fillRef idx="0">
-              <a:schemeClr val="accent1"/>
-            </a:fillRef>
-            <a:effectRef idx="0">
-              <a:schemeClr val="accent1"/>
-            </a:effectRef>
-            <a:fontRef idx="minor">
-              <a:schemeClr val="tx1"/>
-            </a:fontRef>
-          </p:style>
-        </p:cxnSp>
-        <p:cxnSp>
-          <p:nvCxnSpPr>
-            <p:cNvPr id="21" name="Straight Connector 20"/>
-            <p:cNvCxnSpPr/>
-            <p:nvPr/>
-          </p:nvCxnSpPr>
-          <p:spPr>
-            <a:xfrm>
-              <a:off x="4728431" y="2933565"/>
-              <a:ext cx="819638" cy="1137811"/>
-            </a:xfrm>
-            <a:prstGeom prst="line">
-              <a:avLst/>
-            </a:prstGeom>
-            <a:ln w="28575">
-              <a:solidFill>
-                <a:srgbClr val="FF0000"/>
-              </a:solidFill>
-            </a:ln>
-          </p:spPr>
-          <p:style>
-            <a:lnRef idx="1">
-              <a:schemeClr val="accent1"/>
-            </a:lnRef>
-            <a:fillRef idx="0">
-              <a:schemeClr val="accent1"/>
-            </a:fillRef>
-            <a:effectRef idx="0">
-              <a:schemeClr val="accent1"/>
-            </a:effectRef>
-            <a:fontRef idx="minor">
-              <a:schemeClr val="tx1"/>
-            </a:fontRef>
-          </p:style>
-        </p:cxnSp>
-        <p:cxnSp>
-          <p:nvCxnSpPr>
-            <p:cNvPr id="22" name="Straight Connector 21"/>
-            <p:cNvCxnSpPr/>
-            <p:nvPr/>
-          </p:nvCxnSpPr>
-          <p:spPr>
-            <a:xfrm>
-              <a:off x="4647225" y="2931241"/>
-              <a:ext cx="689860" cy="1146866"/>
-            </a:xfrm>
-            <a:prstGeom prst="line">
-              <a:avLst/>
-            </a:prstGeom>
-            <a:ln w="28575">
-              <a:solidFill>
-                <a:srgbClr val="FF0000"/>
-              </a:solidFill>
-            </a:ln>
-          </p:spPr>
-          <p:style>
-            <a:lnRef idx="1">
-              <a:schemeClr val="accent1"/>
-            </a:lnRef>
-            <a:fillRef idx="0">
-              <a:schemeClr val="accent1"/>
-            </a:fillRef>
-            <a:effectRef idx="0">
-              <a:schemeClr val="accent1"/>
-            </a:effectRef>
-            <a:fontRef idx="minor">
-              <a:schemeClr val="tx1"/>
-            </a:fontRef>
-          </p:style>
-        </p:cxnSp>
-        <p:cxnSp>
-          <p:nvCxnSpPr>
-            <p:cNvPr id="23" name="Straight Connector 22"/>
-            <p:cNvCxnSpPr/>
-            <p:nvPr/>
-          </p:nvCxnSpPr>
-          <p:spPr>
-            <a:xfrm>
-              <a:off x="4587478" y="2931241"/>
-              <a:ext cx="508001" cy="1140135"/>
-            </a:xfrm>
-            <a:prstGeom prst="line">
-              <a:avLst/>
-            </a:prstGeom>
-            <a:ln w="28575">
-              <a:solidFill>
-                <a:srgbClr val="FF0000"/>
-              </a:solidFill>
-            </a:ln>
-          </p:spPr>
-          <p:style>
-            <a:lnRef idx="1">
-              <a:schemeClr val="accent1"/>
-            </a:lnRef>
-            <a:fillRef idx="0">
-              <a:schemeClr val="accent1"/>
-            </a:fillRef>
-            <a:effectRef idx="0">
-              <a:schemeClr val="accent1"/>
-            </a:effectRef>
-            <a:fontRef idx="minor">
-              <a:schemeClr val="tx1"/>
-            </a:fontRef>
-          </p:style>
-        </p:cxnSp>
-        <p:cxnSp>
-          <p:nvCxnSpPr>
-            <p:cNvPr id="24" name="Straight Connector 23"/>
-            <p:cNvCxnSpPr/>
-            <p:nvPr/>
-          </p:nvCxnSpPr>
-          <p:spPr>
-            <a:xfrm>
-              <a:off x="4524375" y="2931241"/>
-              <a:ext cx="372055" cy="1146866"/>
-            </a:xfrm>
-            <a:prstGeom prst="line">
-              <a:avLst/>
-            </a:prstGeom>
-            <a:ln w="28575">
-              <a:solidFill>
-                <a:srgbClr val="FF0000"/>
-              </a:solidFill>
-            </a:ln>
-          </p:spPr>
-          <p:style>
-            <a:lnRef idx="1">
-              <a:schemeClr val="accent1"/>
-            </a:lnRef>
-            <a:fillRef idx="0">
-              <a:schemeClr val="accent1"/>
-            </a:fillRef>
-            <a:effectRef idx="0">
-              <a:schemeClr val="accent1"/>
-            </a:effectRef>
-            <a:fontRef idx="minor">
-              <a:schemeClr val="tx1"/>
-            </a:fontRef>
-          </p:style>
-        </p:cxnSp>
-        <p:cxnSp>
-          <p:nvCxnSpPr>
-            <p:cNvPr id="25" name="Straight Connector 24"/>
-            <p:cNvCxnSpPr/>
-            <p:nvPr/>
-          </p:nvCxnSpPr>
-          <p:spPr>
-            <a:xfrm>
-              <a:off x="4453181" y="2931241"/>
-              <a:ext cx="204548" cy="1133226"/>
-            </a:xfrm>
-            <a:prstGeom prst="line">
-              <a:avLst/>
-            </a:prstGeom>
-            <a:ln w="28575">
-              <a:solidFill>
-                <a:srgbClr val="FF0000"/>
-              </a:solidFill>
-            </a:ln>
-          </p:spPr>
-          <p:style>
-            <a:lnRef idx="1">
-              <a:schemeClr val="accent1"/>
-            </a:lnRef>
-            <a:fillRef idx="0">
-              <a:schemeClr val="accent1"/>
-            </a:fillRef>
-            <a:effectRef idx="0">
-              <a:schemeClr val="accent1"/>
-            </a:effectRef>
-            <a:fontRef idx="minor">
-              <a:schemeClr val="tx1"/>
-            </a:fontRef>
-          </p:style>
-        </p:cxnSp>
-        <p:cxnSp>
-          <p:nvCxnSpPr>
-            <p:cNvPr id="26" name="Straight Connector 25"/>
-            <p:cNvCxnSpPr/>
-            <p:nvPr/>
-          </p:nvCxnSpPr>
-          <p:spPr>
-            <a:xfrm>
-              <a:off x="4395056" y="2931241"/>
-              <a:ext cx="52139" cy="1149331"/>
-            </a:xfrm>
-            <a:prstGeom prst="line">
-              <a:avLst/>
-            </a:prstGeom>
-            <a:ln w="28575">
-              <a:solidFill>
-                <a:srgbClr val="FF0000"/>
-              </a:solidFill>
-            </a:ln>
-          </p:spPr>
-          <p:style>
-            <a:lnRef idx="1">
-              <a:schemeClr val="accent1"/>
-            </a:lnRef>
-            <a:fillRef idx="0">
-              <a:schemeClr val="accent1"/>
-            </a:fillRef>
-            <a:effectRef idx="0">
-              <a:schemeClr val="accent1"/>
-            </a:effectRef>
-            <a:fontRef idx="minor">
-              <a:schemeClr val="tx1"/>
-            </a:fontRef>
-          </p:style>
-        </p:cxnSp>
-        <p:cxnSp>
-          <p:nvCxnSpPr>
-            <p:cNvPr id="27" name="Straight Connector 26"/>
-            <p:cNvCxnSpPr/>
-            <p:nvPr/>
-          </p:nvCxnSpPr>
-          <p:spPr>
-            <a:xfrm flipH="1">
-              <a:off x="4227713" y="2938196"/>
-              <a:ext cx="110193" cy="1133180"/>
-            </a:xfrm>
-            <a:prstGeom prst="line">
-              <a:avLst/>
-            </a:prstGeom>
-            <a:ln w="28575">
-              <a:solidFill>
-                <a:srgbClr val="FF0000"/>
-              </a:solidFill>
-            </a:ln>
-          </p:spPr>
-          <p:style>
-            <a:lnRef idx="1">
-              <a:schemeClr val="accent1"/>
-            </a:lnRef>
-            <a:fillRef idx="0">
-              <a:schemeClr val="accent1"/>
-            </a:fillRef>
-            <a:effectRef idx="0">
-              <a:schemeClr val="accent1"/>
-            </a:effectRef>
-            <a:fontRef idx="minor">
-              <a:schemeClr val="tx1"/>
-            </a:fontRef>
-          </p:style>
-        </p:cxnSp>
-        <p:cxnSp>
-          <p:nvCxnSpPr>
-            <p:cNvPr id="28" name="Straight Connector 27"/>
-            <p:cNvCxnSpPr/>
-            <p:nvPr/>
-          </p:nvCxnSpPr>
-          <p:spPr>
-            <a:xfrm flipH="1">
-              <a:off x="3780234" y="2938196"/>
-              <a:ext cx="486478" cy="1133180"/>
-            </a:xfrm>
-            <a:prstGeom prst="line">
-              <a:avLst/>
-            </a:prstGeom>
-            <a:ln w="28575">
-              <a:solidFill>
-                <a:srgbClr val="FF0000"/>
-              </a:solidFill>
-            </a:ln>
-          </p:spPr>
-          <p:style>
-            <a:lnRef idx="1">
-              <a:schemeClr val="accent1"/>
-            </a:lnRef>
-            <a:fillRef idx="0">
-              <a:schemeClr val="accent1"/>
-            </a:fillRef>
-            <a:effectRef idx="0">
-              <a:schemeClr val="accent1"/>
-            </a:effectRef>
-            <a:fontRef idx="minor">
-              <a:schemeClr val="tx1"/>
-            </a:fontRef>
-          </p:style>
-        </p:cxnSp>
-        <p:cxnSp>
-          <p:nvCxnSpPr>
-            <p:cNvPr id="29" name="Straight Connector 28"/>
-            <p:cNvCxnSpPr/>
-            <p:nvPr/>
-          </p:nvCxnSpPr>
-          <p:spPr>
-            <a:xfrm flipH="1">
-              <a:off x="3565847" y="2931241"/>
-              <a:ext cx="635962" cy="1130902"/>
-            </a:xfrm>
-            <a:prstGeom prst="line">
-              <a:avLst/>
-            </a:prstGeom>
-            <a:ln w="28575">
-              <a:solidFill>
-                <a:srgbClr val="FF0000"/>
-              </a:solidFill>
-            </a:ln>
-          </p:spPr>
-          <p:style>
-            <a:lnRef idx="1">
-              <a:schemeClr val="accent1"/>
-            </a:lnRef>
-            <a:fillRef idx="0">
-              <a:schemeClr val="accent1"/>
-            </a:fillRef>
-            <a:effectRef idx="0">
-              <a:schemeClr val="accent1"/>
-            </a:effectRef>
-            <a:fontRef idx="minor">
-              <a:schemeClr val="tx1"/>
-            </a:fontRef>
-          </p:style>
-        </p:cxnSp>
-        <p:cxnSp>
-          <p:nvCxnSpPr>
-            <p:cNvPr id="30" name="Straight Connector 29"/>
-            <p:cNvCxnSpPr/>
-            <p:nvPr/>
-          </p:nvCxnSpPr>
-          <p:spPr>
-            <a:xfrm flipH="1">
-              <a:off x="3340894" y="2938196"/>
-              <a:ext cx="661866" cy="1133180"/>
-            </a:xfrm>
-            <a:prstGeom prst="line">
-              <a:avLst/>
-            </a:prstGeom>
-            <a:ln w="28575">
-              <a:solidFill>
-                <a:srgbClr val="FF0000"/>
-              </a:solidFill>
-            </a:ln>
-          </p:spPr>
-          <p:style>
-            <a:lnRef idx="1">
-              <a:schemeClr val="accent1"/>
-            </a:lnRef>
-            <a:fillRef idx="0">
-              <a:schemeClr val="accent1"/>
-            </a:fillRef>
-            <a:effectRef idx="0">
-              <a:schemeClr val="accent1"/>
-            </a:effectRef>
-            <a:fontRef idx="minor">
-              <a:schemeClr val="tx1"/>
-            </a:fontRef>
-          </p:style>
-        </p:cxnSp>
-        <p:cxnSp>
-          <p:nvCxnSpPr>
-            <p:cNvPr id="31" name="Straight Connector 30"/>
-            <p:cNvCxnSpPr/>
-            <p:nvPr/>
-          </p:nvCxnSpPr>
-          <p:spPr>
-            <a:xfrm flipH="1">
-              <a:off x="3144441" y="2931241"/>
-              <a:ext cx="800101" cy="1125730"/>
-            </a:xfrm>
-            <a:prstGeom prst="line">
-              <a:avLst/>
-            </a:prstGeom>
-            <a:ln w="28575">
-              <a:solidFill>
-                <a:srgbClr val="FF0000"/>
-              </a:solidFill>
-            </a:ln>
-          </p:spPr>
-          <p:style>
-            <a:lnRef idx="1">
-              <a:schemeClr val="accent1"/>
-            </a:lnRef>
-            <a:fillRef idx="0">
-              <a:schemeClr val="accent1"/>
-            </a:fillRef>
-            <a:effectRef idx="0">
-              <a:schemeClr val="accent1"/>
-            </a:effectRef>
-            <a:fontRef idx="minor">
-              <a:schemeClr val="tx1"/>
-            </a:fontRef>
-          </p:style>
-        </p:cxnSp>
-        <p:cxnSp>
-          <p:nvCxnSpPr>
-            <p:cNvPr id="32" name="Straight Connector 31"/>
-            <p:cNvCxnSpPr/>
-            <p:nvPr/>
-          </p:nvCxnSpPr>
-          <p:spPr>
-            <a:xfrm flipH="1">
-              <a:off x="2906316" y="2938196"/>
-              <a:ext cx="979640" cy="1118775"/>
-            </a:xfrm>
-            <a:prstGeom prst="line">
-              <a:avLst/>
-            </a:prstGeom>
-            <a:ln w="28575">
-              <a:solidFill>
-                <a:srgbClr val="FF0000"/>
-              </a:solidFill>
-            </a:ln>
-          </p:spPr>
-          <p:style>
-            <a:lnRef idx="1">
-              <a:schemeClr val="accent1"/>
-            </a:lnRef>
-            <a:fillRef idx="0">
-              <a:schemeClr val="accent1"/>
-            </a:fillRef>
-            <a:effectRef idx="0">
-              <a:schemeClr val="accent1"/>
-            </a:effectRef>
-            <a:fontRef idx="minor">
-              <a:schemeClr val="tx1"/>
-            </a:fontRef>
-          </p:style>
-        </p:cxnSp>
-        <p:cxnSp>
-          <p:nvCxnSpPr>
-            <p:cNvPr id="33" name="Straight Connector 32"/>
-            <p:cNvCxnSpPr/>
-            <p:nvPr/>
-          </p:nvCxnSpPr>
-          <p:spPr>
-            <a:xfrm flipH="1">
-              <a:off x="2661176" y="2869553"/>
-              <a:ext cx="1167617" cy="772744"/>
-            </a:xfrm>
-            <a:prstGeom prst="line">
-              <a:avLst/>
-            </a:prstGeom>
-            <a:ln w="28575">
-              <a:solidFill>
-                <a:srgbClr val="FF0000"/>
-              </a:solidFill>
-            </a:ln>
-          </p:spPr>
-          <p:style>
-            <a:lnRef idx="1">
-              <a:schemeClr val="accent1"/>
-            </a:lnRef>
-            <a:fillRef idx="0">
-              <a:schemeClr val="accent1"/>
-            </a:fillRef>
-            <a:effectRef idx="0">
-              <a:schemeClr val="accent1"/>
-            </a:effectRef>
-            <a:fontRef idx="minor">
-              <a:schemeClr val="tx1"/>
-            </a:fontRef>
-          </p:style>
-        </p:cxnSp>
-        <p:cxnSp>
-          <p:nvCxnSpPr>
-            <p:cNvPr id="34" name="Straight Connector 33"/>
-            <p:cNvCxnSpPr/>
-            <p:nvPr/>
-          </p:nvCxnSpPr>
-          <p:spPr>
-            <a:xfrm flipH="1">
-              <a:off x="2661176" y="2812256"/>
-              <a:ext cx="1173602" cy="618646"/>
-            </a:xfrm>
-            <a:prstGeom prst="line">
-              <a:avLst/>
-            </a:prstGeom>
-            <a:ln w="28575">
-              <a:solidFill>
-                <a:srgbClr val="FF0000"/>
-              </a:solidFill>
-            </a:ln>
-          </p:spPr>
-          <p:style>
-            <a:lnRef idx="1">
-              <a:schemeClr val="accent1"/>
-            </a:lnRef>
-            <a:fillRef idx="0">
-              <a:schemeClr val="accent1"/>
-            </a:fillRef>
-            <a:effectRef idx="0">
-              <a:schemeClr val="accent1"/>
-            </a:effectRef>
-            <a:fontRef idx="minor">
-              <a:schemeClr val="tx1"/>
-            </a:fontRef>
-          </p:style>
-        </p:cxnSp>
-        <p:cxnSp>
-          <p:nvCxnSpPr>
-            <p:cNvPr id="35" name="Straight Connector 34"/>
-            <p:cNvCxnSpPr/>
-            <p:nvPr/>
-          </p:nvCxnSpPr>
-          <p:spPr>
-            <a:xfrm flipH="1">
-              <a:off x="2661176" y="2624102"/>
-              <a:ext cx="1156084" cy="367233"/>
-            </a:xfrm>
-            <a:prstGeom prst="line">
-              <a:avLst/>
-            </a:prstGeom>
-            <a:ln w="28575">
-              <a:solidFill>
-                <a:srgbClr val="FF0000"/>
-              </a:solidFill>
-            </a:ln>
-          </p:spPr>
-          <p:style>
-            <a:lnRef idx="1">
-              <a:schemeClr val="accent1"/>
-            </a:lnRef>
-            <a:fillRef idx="0">
-              <a:schemeClr val="accent1"/>
-            </a:fillRef>
-            <a:effectRef idx="0">
-              <a:schemeClr val="accent1"/>
-            </a:effectRef>
-            <a:fontRef idx="minor">
-              <a:schemeClr val="tx1"/>
-            </a:fontRef>
-          </p:style>
-        </p:cxnSp>
-        <p:cxnSp>
-          <p:nvCxnSpPr>
-            <p:cNvPr id="36" name="Straight Connector 35"/>
-            <p:cNvCxnSpPr/>
-            <p:nvPr/>
-          </p:nvCxnSpPr>
-          <p:spPr>
-            <a:xfrm flipH="1" flipV="1">
-              <a:off x="2661825" y="966728"/>
-              <a:ext cx="1166967" cy="995422"/>
-            </a:xfrm>
-            <a:prstGeom prst="line">
-              <a:avLst/>
-            </a:prstGeom>
-            <a:ln w="28575">
-              <a:solidFill>
-                <a:srgbClr val="FF0000"/>
-              </a:solidFill>
-            </a:ln>
-          </p:spPr>
-          <p:style>
-            <a:lnRef idx="1">
-              <a:schemeClr val="accent1"/>
-            </a:lnRef>
-            <a:fillRef idx="0">
-              <a:schemeClr val="accent1"/>
-            </a:fillRef>
-            <a:effectRef idx="0">
-              <a:schemeClr val="accent1"/>
-            </a:effectRef>
-            <a:fontRef idx="minor">
-              <a:schemeClr val="tx1"/>
-            </a:fontRef>
-          </p:style>
-        </p:cxnSp>
-        <p:cxnSp>
-          <p:nvCxnSpPr>
-            <p:cNvPr id="37" name="Straight Connector 36"/>
-            <p:cNvCxnSpPr/>
-            <p:nvPr/>
-          </p:nvCxnSpPr>
-          <p:spPr>
-            <a:xfrm flipH="1" flipV="1">
-              <a:off x="2672710" y="1201647"/>
-              <a:ext cx="1144548" cy="829147"/>
-            </a:xfrm>
-            <a:prstGeom prst="line">
-              <a:avLst/>
-            </a:prstGeom>
-            <a:ln w="28575">
-              <a:solidFill>
-                <a:srgbClr val="FF0000"/>
-              </a:solidFill>
-            </a:ln>
-          </p:spPr>
-          <p:style>
-            <a:lnRef idx="1">
-              <a:schemeClr val="accent1"/>
-            </a:lnRef>
-            <a:fillRef idx="0">
-              <a:schemeClr val="accent1"/>
-            </a:fillRef>
-            <a:effectRef idx="0">
-              <a:schemeClr val="accent1"/>
-            </a:effectRef>
-            <a:fontRef idx="minor">
-              <a:schemeClr val="tx1"/>
-            </a:fontRef>
-          </p:style>
-        </p:cxnSp>
-        <p:cxnSp>
-          <p:nvCxnSpPr>
-            <p:cNvPr id="38" name="Straight Connector 37"/>
-            <p:cNvCxnSpPr/>
-            <p:nvPr/>
-          </p:nvCxnSpPr>
-          <p:spPr>
-            <a:xfrm flipH="1" flipV="1">
-              <a:off x="2672710" y="1630591"/>
-              <a:ext cx="1155434" cy="666123"/>
-            </a:xfrm>
-            <a:prstGeom prst="line">
-              <a:avLst/>
-            </a:prstGeom>
-            <a:ln w="28575">
-              <a:solidFill>
-                <a:srgbClr val="FF0000"/>
-              </a:solidFill>
-            </a:ln>
-          </p:spPr>
-          <p:style>
-            <a:lnRef idx="1">
-              <a:schemeClr val="accent1"/>
-            </a:lnRef>
-            <a:fillRef idx="0">
-              <a:schemeClr val="accent1"/>
-            </a:fillRef>
-            <a:effectRef idx="0">
-              <a:schemeClr val="accent1"/>
-            </a:effectRef>
-            <a:fontRef idx="minor">
-              <a:schemeClr val="tx1"/>
-            </a:fontRef>
-          </p:style>
-        </p:cxnSp>
-        <p:cxnSp>
-          <p:nvCxnSpPr>
-            <p:cNvPr id="39" name="Straight Connector 38"/>
-            <p:cNvCxnSpPr/>
-            <p:nvPr/>
-          </p:nvCxnSpPr>
-          <p:spPr>
-            <a:xfrm flipH="1" flipV="1">
-              <a:off x="2661176" y="2088091"/>
-              <a:ext cx="1173602" cy="356783"/>
-            </a:xfrm>
-            <a:prstGeom prst="line">
-              <a:avLst/>
-            </a:prstGeom>
-            <a:ln w="28575">
-              <a:solidFill>
-                <a:srgbClr val="FF0000"/>
-              </a:solidFill>
-            </a:ln>
-          </p:spPr>
-          <p:style>
-            <a:lnRef idx="1">
-              <a:schemeClr val="accent1"/>
-            </a:lnRef>
-            <a:fillRef idx="0">
-              <a:schemeClr val="accent1"/>
-            </a:fillRef>
-            <a:effectRef idx="0">
-              <a:schemeClr val="accent1"/>
-            </a:effectRef>
-            <a:fontRef idx="minor">
-              <a:schemeClr val="tx1"/>
-            </a:fontRef>
-          </p:style>
-        </p:cxnSp>
-        <p:cxnSp>
-          <p:nvCxnSpPr>
-            <p:cNvPr id="40" name="Straight Connector 39"/>
-            <p:cNvCxnSpPr/>
-            <p:nvPr/>
-          </p:nvCxnSpPr>
-          <p:spPr>
-            <a:xfrm flipH="1" flipV="1">
-              <a:off x="2650291" y="2329533"/>
-              <a:ext cx="1184487" cy="155335"/>
-            </a:xfrm>
-            <a:prstGeom prst="line">
-              <a:avLst/>
-            </a:prstGeom>
-            <a:ln w="28575">
-              <a:solidFill>
-                <a:srgbClr val="FF0000"/>
-              </a:solidFill>
-            </a:ln>
-          </p:spPr>
-          <p:style>
-            <a:lnRef idx="1">
-              <a:schemeClr val="accent1"/>
-            </a:lnRef>
-            <a:fillRef idx="0">
-              <a:schemeClr val="accent1"/>
-            </a:fillRef>
-            <a:effectRef idx="0">
-              <a:schemeClr val="accent1"/>
-            </a:effectRef>
-            <a:fontRef idx="minor">
-              <a:schemeClr val="tx1"/>
-            </a:fontRef>
-          </p:style>
-        </p:cxnSp>
-        <p:cxnSp>
-          <p:nvCxnSpPr>
-            <p:cNvPr id="41" name="Straight Connector 40"/>
-            <p:cNvCxnSpPr/>
-            <p:nvPr/>
-          </p:nvCxnSpPr>
-          <p:spPr>
-            <a:xfrm flipH="1" flipV="1">
-              <a:off x="2644135" y="2533413"/>
-              <a:ext cx="1177758" cy="22046"/>
-            </a:xfrm>
-            <a:prstGeom prst="line">
-              <a:avLst/>
-            </a:prstGeom>
-            <a:ln w="28575">
-              <a:solidFill>
-                <a:srgbClr val="FF0000"/>
-              </a:solidFill>
-            </a:ln>
-          </p:spPr>
-          <p:style>
-            <a:lnRef idx="1">
-              <a:schemeClr val="accent1"/>
-            </a:lnRef>
-            <a:fillRef idx="0">
-              <a:schemeClr val="accent1"/>
-            </a:fillRef>
-            <a:effectRef idx="0">
-              <a:schemeClr val="accent1"/>
-            </a:effectRef>
-            <a:fontRef idx="minor">
-              <a:schemeClr val="tx1"/>
-            </a:fontRef>
-          </p:style>
-        </p:cxnSp>
-        <p:cxnSp>
-          <p:nvCxnSpPr>
-            <p:cNvPr id="42" name="Straight Connector 41"/>
-            <p:cNvCxnSpPr/>
-            <p:nvPr/>
-          </p:nvCxnSpPr>
-          <p:spPr>
-            <a:xfrm flipH="1" flipV="1">
-              <a:off x="2876550" y="735434"/>
-              <a:ext cx="1009406" cy="1182758"/>
-            </a:xfrm>
-            <a:prstGeom prst="line">
-              <a:avLst/>
-            </a:prstGeom>
-            <a:ln w="28575">
-              <a:solidFill>
-                <a:srgbClr val="FF0000"/>
-              </a:solidFill>
-            </a:ln>
-          </p:spPr>
-          <p:style>
-            <a:lnRef idx="1">
-              <a:schemeClr val="accent1"/>
-            </a:lnRef>
-            <a:fillRef idx="0">
-              <a:schemeClr val="accent1"/>
-            </a:fillRef>
-            <a:effectRef idx="0">
-              <a:schemeClr val="accent1"/>
-            </a:effectRef>
-            <a:fontRef idx="minor">
-              <a:schemeClr val="tx1"/>
-            </a:fontRef>
-          </p:style>
-        </p:cxnSp>
-        <p:cxnSp>
-          <p:nvCxnSpPr>
-            <p:cNvPr id="43" name="Straight Connector 42"/>
-            <p:cNvCxnSpPr/>
-            <p:nvPr/>
-          </p:nvCxnSpPr>
-          <p:spPr>
-            <a:xfrm flipH="1" flipV="1">
-              <a:off x="3303812" y="735434"/>
-              <a:ext cx="785984" cy="1175756"/>
-            </a:xfrm>
-            <a:prstGeom prst="line">
-              <a:avLst/>
-            </a:prstGeom>
-            <a:ln w="28575">
-              <a:solidFill>
-                <a:srgbClr val="FF0000"/>
-              </a:solidFill>
-            </a:ln>
-          </p:spPr>
-          <p:style>
-            <a:lnRef idx="1">
-              <a:schemeClr val="accent1"/>
-            </a:lnRef>
-            <a:fillRef idx="0">
-              <a:schemeClr val="accent1"/>
-            </a:fillRef>
-            <a:effectRef idx="0">
-              <a:schemeClr val="accent1"/>
-            </a:effectRef>
-            <a:fontRef idx="minor">
-              <a:schemeClr val="tx1"/>
-            </a:fontRef>
-          </p:style>
-        </p:cxnSp>
-        <p:cxnSp>
-          <p:nvCxnSpPr>
-            <p:cNvPr id="44" name="Straight Connector 43"/>
-            <p:cNvCxnSpPr/>
-            <p:nvPr/>
-          </p:nvCxnSpPr>
-          <p:spPr>
-            <a:xfrm flipH="1" flipV="1">
-              <a:off x="3565847" y="753782"/>
-              <a:ext cx="582291" cy="1160910"/>
-            </a:xfrm>
-            <a:prstGeom prst="line">
-              <a:avLst/>
-            </a:prstGeom>
-            <a:ln w="28575">
-              <a:solidFill>
-                <a:srgbClr val="FF0000"/>
-              </a:solidFill>
-            </a:ln>
-          </p:spPr>
-          <p:style>
-            <a:lnRef idx="1">
-              <a:schemeClr val="accent1"/>
-            </a:lnRef>
-            <a:fillRef idx="0">
-              <a:schemeClr val="accent1"/>
-            </a:fillRef>
-            <a:effectRef idx="0">
-              <a:schemeClr val="accent1"/>
-            </a:effectRef>
-            <a:fontRef idx="minor">
-              <a:schemeClr val="tx1"/>
-            </a:fontRef>
-          </p:style>
-        </p:cxnSp>
-        <p:cxnSp>
-          <p:nvCxnSpPr>
-            <p:cNvPr id="45" name="Straight Connector 44"/>
-            <p:cNvCxnSpPr/>
-            <p:nvPr/>
-          </p:nvCxnSpPr>
-          <p:spPr>
-            <a:xfrm flipV="1">
-              <a:off x="4728432" y="753782"/>
-              <a:ext cx="1048371" cy="1153218"/>
-            </a:xfrm>
-            <a:prstGeom prst="line">
-              <a:avLst/>
-            </a:prstGeom>
-            <a:ln w="28575">
-              <a:solidFill>
-                <a:srgbClr val="FF0000"/>
-              </a:solidFill>
-            </a:ln>
-          </p:spPr>
-          <p:style>
-            <a:lnRef idx="1">
-              <a:schemeClr val="accent1"/>
-            </a:lnRef>
-            <a:fillRef idx="0">
-              <a:schemeClr val="accent1"/>
-            </a:fillRef>
-            <a:effectRef idx="0">
-              <a:schemeClr val="accent1"/>
-            </a:effectRef>
-            <a:fontRef idx="minor">
-              <a:schemeClr val="tx1"/>
-            </a:fontRef>
-          </p:style>
-        </p:cxnSp>
-        <p:cxnSp>
-          <p:nvCxnSpPr>
-            <p:cNvPr id="46" name="Straight Connector 45"/>
-            <p:cNvCxnSpPr/>
-            <p:nvPr/>
-          </p:nvCxnSpPr>
-          <p:spPr>
-            <a:xfrm flipV="1">
-              <a:off x="4587478" y="758602"/>
-              <a:ext cx="738441" cy="1159591"/>
-            </a:xfrm>
-            <a:prstGeom prst="line">
-              <a:avLst/>
-            </a:prstGeom>
-            <a:ln w="28575">
-              <a:solidFill>
-                <a:srgbClr val="FF0000"/>
-              </a:solidFill>
-            </a:ln>
-          </p:spPr>
-          <p:style>
-            <a:lnRef idx="1">
-              <a:schemeClr val="accent1"/>
-            </a:lnRef>
-            <a:fillRef idx="0">
-              <a:schemeClr val="accent1"/>
-            </a:fillRef>
-            <a:effectRef idx="0">
-              <a:schemeClr val="accent1"/>
-            </a:effectRef>
-            <a:fontRef idx="minor">
-              <a:schemeClr val="tx1"/>
-            </a:fontRef>
-          </p:style>
-        </p:cxnSp>
-        <p:cxnSp>
-          <p:nvCxnSpPr>
-            <p:cNvPr id="47" name="Straight Connector 46"/>
-            <p:cNvCxnSpPr/>
-            <p:nvPr/>
-          </p:nvCxnSpPr>
-          <p:spPr>
-            <a:xfrm flipV="1">
-              <a:off x="4524375" y="753782"/>
-              <a:ext cx="583694" cy="1155542"/>
-            </a:xfrm>
-            <a:prstGeom prst="line">
-              <a:avLst/>
-            </a:prstGeom>
-            <a:ln w="28575">
-              <a:solidFill>
-                <a:srgbClr val="FF0000"/>
-              </a:solidFill>
-            </a:ln>
-          </p:spPr>
-          <p:style>
-            <a:lnRef idx="1">
-              <a:schemeClr val="accent1"/>
-            </a:lnRef>
-            <a:fillRef idx="0">
-              <a:schemeClr val="accent1"/>
-            </a:fillRef>
-            <a:effectRef idx="0">
-              <a:schemeClr val="accent1"/>
-            </a:effectRef>
-            <a:fontRef idx="minor">
-              <a:schemeClr val="tx1"/>
-            </a:fontRef>
-          </p:style>
-        </p:cxnSp>
-        <p:cxnSp>
-          <p:nvCxnSpPr>
-            <p:cNvPr id="48" name="Straight Connector 47"/>
-            <p:cNvCxnSpPr/>
-            <p:nvPr/>
-          </p:nvCxnSpPr>
-          <p:spPr>
-            <a:xfrm flipV="1">
-              <a:off x="4475448" y="731839"/>
-              <a:ext cx="201253" cy="1181988"/>
-            </a:xfrm>
-            <a:prstGeom prst="line">
-              <a:avLst/>
-            </a:prstGeom>
-            <a:ln w="28575">
-              <a:solidFill>
-                <a:srgbClr val="FF0000"/>
-              </a:solidFill>
-            </a:ln>
-          </p:spPr>
-          <p:style>
-            <a:lnRef idx="1">
-              <a:schemeClr val="accent1"/>
-            </a:lnRef>
-            <a:fillRef idx="0">
-              <a:schemeClr val="accent1"/>
-            </a:fillRef>
-            <a:effectRef idx="0">
-              <a:schemeClr val="accent1"/>
-            </a:effectRef>
-            <a:fontRef idx="minor">
-              <a:schemeClr val="tx1"/>
-            </a:fontRef>
-          </p:style>
-        </p:cxnSp>
-        <p:cxnSp>
-          <p:nvCxnSpPr>
-            <p:cNvPr id="49" name="Straight Connector 48"/>
-            <p:cNvCxnSpPr/>
-            <p:nvPr/>
-          </p:nvCxnSpPr>
-          <p:spPr>
-            <a:xfrm flipH="1" flipV="1">
-              <a:off x="4237647" y="731839"/>
-              <a:ext cx="164036" cy="1181989"/>
-            </a:xfrm>
-            <a:prstGeom prst="line">
-              <a:avLst/>
-            </a:prstGeom>
-            <a:ln w="28575">
-              <a:solidFill>
-                <a:srgbClr val="FF0000"/>
-              </a:solidFill>
-            </a:ln>
-          </p:spPr>
-          <p:style>
-            <a:lnRef idx="1">
-              <a:schemeClr val="accent1"/>
-            </a:lnRef>
-            <a:fillRef idx="0">
-              <a:schemeClr val="accent1"/>
-            </a:fillRef>
-            <a:effectRef idx="0">
-              <a:schemeClr val="accent1"/>
-            </a:effectRef>
-            <a:fontRef idx="minor">
-              <a:schemeClr val="tx1"/>
-            </a:fontRef>
-          </p:style>
-        </p:cxnSp>
-        <p:cxnSp>
-          <p:nvCxnSpPr>
-            <p:cNvPr id="50" name="Straight Connector 49"/>
-            <p:cNvCxnSpPr/>
-            <p:nvPr/>
-          </p:nvCxnSpPr>
-          <p:spPr>
-            <a:xfrm flipH="1" flipV="1">
-              <a:off x="4000442" y="714375"/>
-              <a:ext cx="336984" cy="1210243"/>
-            </a:xfrm>
-            <a:prstGeom prst="line">
-              <a:avLst/>
-            </a:prstGeom>
-            <a:ln w="28575">
-              <a:solidFill>
-                <a:srgbClr val="FF0000"/>
-              </a:solidFill>
-            </a:ln>
-          </p:spPr>
-          <p:style>
-            <a:lnRef idx="1">
-              <a:schemeClr val="accent1"/>
-            </a:lnRef>
-            <a:fillRef idx="0">
-              <a:schemeClr val="accent1"/>
-            </a:fillRef>
-            <a:effectRef idx="0">
-              <a:schemeClr val="accent1"/>
-            </a:effectRef>
-            <a:fontRef idx="minor">
-              <a:schemeClr val="tx1"/>
-            </a:fontRef>
-          </p:style>
-        </p:cxnSp>
-      </p:grpSp>
+            <a:off x="384048" y="722376"/>
+            <a:ext cx="5467350" cy="5486400"/>
+          </a:xfrm>
+          <a:prstGeom prst="rect">
+            <a:avLst/>
+          </a:prstGeom>
+        </p:spPr>
+      </p:pic>
+      <p:cxnSp>
+        <p:nvCxnSpPr>
+          <p:cNvPr id="6" name="Straight Connector 5"/>
+          <p:cNvCxnSpPr/>
+          <p:nvPr/>
+        </p:nvCxnSpPr>
+        <p:spPr>
+          <a:xfrm flipV="1">
+            <a:off x="3785902" y="1512453"/>
+            <a:ext cx="1589460" cy="1419213"/>
+          </a:xfrm>
+          <a:prstGeom prst="line">
+            <a:avLst/>
+          </a:prstGeom>
+          <a:ln w="28575">
+            <a:solidFill>
+              <a:srgbClr val="FF0000"/>
+            </a:solidFill>
+          </a:ln>
+        </p:spPr>
+        <p:style>
+          <a:lnRef idx="1">
+            <a:schemeClr val="accent1"/>
+          </a:lnRef>
+          <a:fillRef idx="0">
+            <a:schemeClr val="accent1"/>
+          </a:fillRef>
+          <a:effectRef idx="0">
+            <a:schemeClr val="accent1"/>
+          </a:effectRef>
+          <a:fontRef idx="minor">
+            <a:schemeClr val="tx1"/>
+          </a:fontRef>
+        </p:style>
+      </p:cxnSp>
+      <p:cxnSp>
+        <p:nvCxnSpPr>
+          <p:cNvPr id="7" name="Straight Connector 6"/>
+          <p:cNvCxnSpPr/>
+          <p:nvPr/>
+        </p:nvCxnSpPr>
+        <p:spPr>
+          <a:xfrm flipV="1">
+            <a:off x="3812184" y="1768999"/>
+            <a:ext cx="1589460" cy="1250141"/>
+          </a:xfrm>
+          <a:prstGeom prst="line">
+            <a:avLst/>
+          </a:prstGeom>
+          <a:ln w="28575">
+            <a:solidFill>
+              <a:srgbClr val="FF0000"/>
+            </a:solidFill>
+          </a:ln>
+        </p:spPr>
+        <p:style>
+          <a:lnRef idx="1">
+            <a:schemeClr val="accent1"/>
+          </a:lnRef>
+          <a:fillRef idx="0">
+            <a:schemeClr val="accent1"/>
+          </a:fillRef>
+          <a:effectRef idx="0">
+            <a:schemeClr val="accent1"/>
+          </a:effectRef>
+          <a:fontRef idx="minor">
+            <a:schemeClr val="tx1"/>
+          </a:fontRef>
+        </p:style>
+      </p:cxnSp>
+      <p:cxnSp>
+        <p:nvCxnSpPr>
+          <p:cNvPr id="8" name="Straight Connector 7"/>
+          <p:cNvCxnSpPr/>
+          <p:nvPr/>
+        </p:nvCxnSpPr>
+        <p:spPr>
+          <a:xfrm flipV="1">
+            <a:off x="3812184" y="2052541"/>
+            <a:ext cx="1601617" cy="1030339"/>
+          </a:xfrm>
+          <a:prstGeom prst="line">
+            <a:avLst/>
+          </a:prstGeom>
+          <a:ln w="28575">
+            <a:solidFill>
+              <a:srgbClr val="FF0000"/>
+            </a:solidFill>
+          </a:ln>
+        </p:spPr>
+        <p:style>
+          <a:lnRef idx="1">
+            <a:schemeClr val="accent1"/>
+          </a:lnRef>
+          <a:fillRef idx="0">
+            <a:schemeClr val="accent1"/>
+          </a:fillRef>
+          <a:effectRef idx="0">
+            <a:schemeClr val="accent1"/>
+          </a:effectRef>
+          <a:fontRef idx="minor">
+            <a:schemeClr val="tx1"/>
+          </a:fontRef>
+        </p:style>
+      </p:cxnSp>
+      <p:cxnSp>
+        <p:nvCxnSpPr>
+          <p:cNvPr id="9" name="Straight Connector 8"/>
+          <p:cNvCxnSpPr/>
+          <p:nvPr/>
+        </p:nvCxnSpPr>
+        <p:spPr>
+          <a:xfrm flipV="1">
+            <a:off x="3785902" y="2391825"/>
+            <a:ext cx="1627899" cy="805424"/>
+          </a:xfrm>
+          <a:prstGeom prst="line">
+            <a:avLst/>
+          </a:prstGeom>
+          <a:ln w="28575">
+            <a:solidFill>
+              <a:srgbClr val="FF0000"/>
+            </a:solidFill>
+          </a:ln>
+        </p:spPr>
+        <p:style>
+          <a:lnRef idx="1">
+            <a:schemeClr val="accent1"/>
+          </a:lnRef>
+          <a:fillRef idx="0">
+            <a:schemeClr val="accent1"/>
+          </a:fillRef>
+          <a:effectRef idx="0">
+            <a:schemeClr val="accent1"/>
+          </a:effectRef>
+          <a:fontRef idx="minor">
+            <a:schemeClr val="tx1"/>
+          </a:fontRef>
+        </p:style>
+      </p:cxnSp>
+      <p:cxnSp>
+        <p:nvCxnSpPr>
+          <p:cNvPr id="10" name="Straight Connector 9"/>
+          <p:cNvCxnSpPr/>
+          <p:nvPr/>
+        </p:nvCxnSpPr>
+        <p:spPr>
+          <a:xfrm flipV="1">
+            <a:off x="3812184" y="2671422"/>
+            <a:ext cx="1589460" cy="616465"/>
+          </a:xfrm>
+          <a:prstGeom prst="line">
+            <a:avLst/>
+          </a:prstGeom>
+          <a:ln w="28575">
+            <a:solidFill>
+              <a:srgbClr val="FF0000"/>
+            </a:solidFill>
+          </a:ln>
+        </p:spPr>
+        <p:style>
+          <a:lnRef idx="1">
+            <a:schemeClr val="accent1"/>
+          </a:lnRef>
+          <a:fillRef idx="0">
+            <a:schemeClr val="accent1"/>
+          </a:fillRef>
+          <a:effectRef idx="0">
+            <a:schemeClr val="accent1"/>
+          </a:effectRef>
+          <a:fontRef idx="minor">
+            <a:schemeClr val="tx1"/>
+          </a:fontRef>
+        </p:style>
+      </p:cxnSp>
+      <p:cxnSp>
+        <p:nvCxnSpPr>
+          <p:cNvPr id="11" name="Straight Connector 10"/>
+          <p:cNvCxnSpPr/>
+          <p:nvPr/>
+        </p:nvCxnSpPr>
+        <p:spPr>
+          <a:xfrm flipV="1">
+            <a:off x="3812184" y="2996797"/>
+            <a:ext cx="1563178" cy="368290"/>
+          </a:xfrm>
+          <a:prstGeom prst="line">
+            <a:avLst/>
+          </a:prstGeom>
+          <a:ln w="28575">
+            <a:solidFill>
+              <a:srgbClr val="FF0000"/>
+            </a:solidFill>
+          </a:ln>
+        </p:spPr>
+        <p:style>
+          <a:lnRef idx="1">
+            <a:schemeClr val="accent1"/>
+          </a:lnRef>
+          <a:fillRef idx="0">
+            <a:schemeClr val="accent1"/>
+          </a:fillRef>
+          <a:effectRef idx="0">
+            <a:schemeClr val="accent1"/>
+          </a:effectRef>
+          <a:fontRef idx="minor">
+            <a:schemeClr val="tx1"/>
+          </a:fontRef>
+        </p:style>
+      </p:cxnSp>
+      <p:cxnSp>
+        <p:nvCxnSpPr>
+          <p:cNvPr id="12" name="Straight Connector 11"/>
+          <p:cNvCxnSpPr/>
+          <p:nvPr/>
+        </p:nvCxnSpPr>
+        <p:spPr>
+          <a:xfrm flipV="1">
+            <a:off x="3812184" y="3307984"/>
+            <a:ext cx="1589460" cy="147902"/>
+          </a:xfrm>
+          <a:prstGeom prst="line">
+            <a:avLst/>
+          </a:prstGeom>
+          <a:ln w="28575">
+            <a:solidFill>
+              <a:srgbClr val="FF0000"/>
+            </a:solidFill>
+          </a:ln>
+        </p:spPr>
+        <p:style>
+          <a:lnRef idx="1">
+            <a:schemeClr val="accent1"/>
+          </a:lnRef>
+          <a:fillRef idx="0">
+            <a:schemeClr val="accent1"/>
+          </a:fillRef>
+          <a:effectRef idx="0">
+            <a:schemeClr val="accent1"/>
+          </a:effectRef>
+          <a:fontRef idx="minor">
+            <a:schemeClr val="tx1"/>
+          </a:fontRef>
+        </p:style>
+      </p:cxnSp>
+      <p:cxnSp>
+        <p:nvCxnSpPr>
+          <p:cNvPr id="13" name="Straight Connector 12"/>
+          <p:cNvCxnSpPr/>
+          <p:nvPr/>
+        </p:nvCxnSpPr>
+        <p:spPr>
+          <a:xfrm>
+            <a:off x="3785902" y="3546686"/>
+            <a:ext cx="1589460" cy="51026"/>
+          </a:xfrm>
+          <a:prstGeom prst="line">
+            <a:avLst/>
+          </a:prstGeom>
+          <a:ln w="28575">
+            <a:solidFill>
+              <a:srgbClr val="FF0000"/>
+            </a:solidFill>
+          </a:ln>
+        </p:spPr>
+        <p:style>
+          <a:lnRef idx="1">
+            <a:schemeClr val="accent1"/>
+          </a:lnRef>
+          <a:fillRef idx="0">
+            <a:schemeClr val="accent1"/>
+          </a:fillRef>
+          <a:effectRef idx="0">
+            <a:schemeClr val="accent1"/>
+          </a:effectRef>
+          <a:fontRef idx="minor">
+            <a:schemeClr val="tx1"/>
+          </a:fontRef>
+        </p:style>
+      </p:cxnSp>
+      <p:cxnSp>
+        <p:nvCxnSpPr>
+          <p:cNvPr id="14" name="Straight Connector 13"/>
+          <p:cNvCxnSpPr/>
+          <p:nvPr/>
+        </p:nvCxnSpPr>
+        <p:spPr>
+          <a:xfrm>
+            <a:off x="3812184" y="3637485"/>
+            <a:ext cx="1563178" cy="289730"/>
+          </a:xfrm>
+          <a:prstGeom prst="line">
+            <a:avLst/>
+          </a:prstGeom>
+          <a:ln w="28575">
+            <a:solidFill>
+              <a:srgbClr val="FF0000"/>
+            </a:solidFill>
+          </a:ln>
+        </p:spPr>
+        <p:style>
+          <a:lnRef idx="1">
+            <a:schemeClr val="accent1"/>
+          </a:lnRef>
+          <a:fillRef idx="0">
+            <a:schemeClr val="accent1"/>
+          </a:fillRef>
+          <a:effectRef idx="0">
+            <a:schemeClr val="accent1"/>
+          </a:effectRef>
+          <a:fontRef idx="minor">
+            <a:schemeClr val="tx1"/>
+          </a:fontRef>
+        </p:style>
+      </p:cxnSp>
+      <p:cxnSp>
+        <p:nvCxnSpPr>
+          <p:cNvPr id="15" name="Straight Connector 14"/>
+          <p:cNvCxnSpPr/>
+          <p:nvPr/>
+        </p:nvCxnSpPr>
+        <p:spPr>
+          <a:xfrm>
+            <a:off x="3785902" y="3728286"/>
+            <a:ext cx="1627899" cy="493998"/>
+          </a:xfrm>
+          <a:prstGeom prst="line">
+            <a:avLst/>
+          </a:prstGeom>
+          <a:ln w="28575">
+            <a:solidFill>
+              <a:srgbClr val="FF0000"/>
+            </a:solidFill>
+          </a:ln>
+        </p:spPr>
+        <p:style>
+          <a:lnRef idx="1">
+            <a:schemeClr val="accent1"/>
+          </a:lnRef>
+          <a:fillRef idx="0">
+            <a:schemeClr val="accent1"/>
+          </a:fillRef>
+          <a:effectRef idx="0">
+            <a:schemeClr val="accent1"/>
+          </a:effectRef>
+          <a:fontRef idx="minor">
+            <a:schemeClr val="tx1"/>
+          </a:fontRef>
+        </p:style>
+      </p:cxnSp>
+      <p:cxnSp>
+        <p:nvCxnSpPr>
+          <p:cNvPr id="16" name="Straight Connector 15"/>
+          <p:cNvCxnSpPr/>
+          <p:nvPr/>
+        </p:nvCxnSpPr>
+        <p:spPr>
+          <a:xfrm>
+            <a:off x="3812184" y="3799827"/>
+            <a:ext cx="1601617" cy="734725"/>
+          </a:xfrm>
+          <a:prstGeom prst="line">
+            <a:avLst/>
+          </a:prstGeom>
+          <a:ln w="28575">
+            <a:solidFill>
+              <a:srgbClr val="FF0000"/>
+            </a:solidFill>
+          </a:ln>
+        </p:spPr>
+        <p:style>
+          <a:lnRef idx="1">
+            <a:schemeClr val="accent1"/>
+          </a:lnRef>
+          <a:fillRef idx="0">
+            <a:schemeClr val="accent1"/>
+          </a:fillRef>
+          <a:effectRef idx="0">
+            <a:schemeClr val="accent1"/>
+          </a:effectRef>
+          <a:fontRef idx="minor">
+            <a:schemeClr val="tx1"/>
+          </a:fontRef>
+        </p:style>
+      </p:cxnSp>
+      <p:cxnSp>
+        <p:nvCxnSpPr>
+          <p:cNvPr id="17" name="Straight Connector 16"/>
+          <p:cNvCxnSpPr/>
+          <p:nvPr/>
+        </p:nvCxnSpPr>
+        <p:spPr>
+          <a:xfrm>
+            <a:off x="3785902" y="3896125"/>
+            <a:ext cx="1589460" cy="917459"/>
+          </a:xfrm>
+          <a:prstGeom prst="line">
+            <a:avLst/>
+          </a:prstGeom>
+          <a:ln w="28575">
+            <a:solidFill>
+              <a:srgbClr val="FF0000"/>
+            </a:solidFill>
+          </a:ln>
+        </p:spPr>
+        <p:style>
+          <a:lnRef idx="1">
+            <a:schemeClr val="accent1"/>
+          </a:lnRef>
+          <a:fillRef idx="0">
+            <a:schemeClr val="accent1"/>
+          </a:fillRef>
+          <a:effectRef idx="0">
+            <a:schemeClr val="accent1"/>
+          </a:effectRef>
+          <a:fontRef idx="minor">
+            <a:schemeClr val="tx1"/>
+          </a:fontRef>
+        </p:style>
+      </p:cxnSp>
+      <p:cxnSp>
+        <p:nvCxnSpPr>
+          <p:cNvPr id="18" name="Straight Connector 17"/>
+          <p:cNvCxnSpPr/>
+          <p:nvPr/>
+        </p:nvCxnSpPr>
+        <p:spPr>
+          <a:xfrm>
+            <a:off x="3812184" y="3956700"/>
+            <a:ext cx="1563178" cy="1141252"/>
+          </a:xfrm>
+          <a:prstGeom prst="line">
+            <a:avLst/>
+          </a:prstGeom>
+          <a:ln w="28575">
+            <a:solidFill>
+              <a:srgbClr val="FF0000"/>
+            </a:solidFill>
+          </a:ln>
+        </p:spPr>
+        <p:style>
+          <a:lnRef idx="1">
+            <a:schemeClr val="accent1"/>
+          </a:lnRef>
+          <a:fillRef idx="0">
+            <a:schemeClr val="accent1"/>
+          </a:fillRef>
+          <a:effectRef idx="0">
+            <a:schemeClr val="accent1"/>
+          </a:effectRef>
+          <a:fontRef idx="minor">
+            <a:schemeClr val="tx1"/>
+          </a:fontRef>
+        </p:style>
+      </p:cxnSp>
+      <p:cxnSp>
+        <p:nvCxnSpPr>
+          <p:cNvPr id="19" name="Straight Connector 18"/>
+          <p:cNvCxnSpPr/>
+          <p:nvPr/>
+        </p:nvCxnSpPr>
+        <p:spPr>
+          <a:xfrm>
+            <a:off x="3785902" y="4058464"/>
+            <a:ext cx="1589460" cy="1351353"/>
+          </a:xfrm>
+          <a:prstGeom prst="line">
+            <a:avLst/>
+          </a:prstGeom>
+          <a:ln w="28575">
+            <a:solidFill>
+              <a:srgbClr val="FF0000"/>
+            </a:solidFill>
+          </a:ln>
+        </p:spPr>
+        <p:style>
+          <a:lnRef idx="1">
+            <a:schemeClr val="accent1"/>
+          </a:lnRef>
+          <a:fillRef idx="0">
+            <a:schemeClr val="accent1"/>
+          </a:fillRef>
+          <a:effectRef idx="0">
+            <a:schemeClr val="accent1"/>
+          </a:effectRef>
+          <a:fontRef idx="minor">
+            <a:schemeClr val="tx1"/>
+          </a:fontRef>
+        </p:style>
+      </p:cxnSp>
+      <p:cxnSp>
+        <p:nvCxnSpPr>
+          <p:cNvPr id="20" name="Straight Connector 19"/>
+          <p:cNvCxnSpPr/>
+          <p:nvPr/>
+        </p:nvCxnSpPr>
+        <p:spPr>
+          <a:xfrm>
+            <a:off x="3747463" y="4156992"/>
+            <a:ext cx="1307576" cy="1518152"/>
+          </a:xfrm>
+          <a:prstGeom prst="line">
+            <a:avLst/>
+          </a:prstGeom>
+          <a:ln w="28575">
+            <a:solidFill>
+              <a:srgbClr val="FF0000"/>
+            </a:solidFill>
+          </a:ln>
+        </p:spPr>
+        <p:style>
+          <a:lnRef idx="1">
+            <a:schemeClr val="accent1"/>
+          </a:lnRef>
+          <a:fillRef idx="0">
+            <a:schemeClr val="accent1"/>
+          </a:fillRef>
+          <a:effectRef idx="0">
+            <a:schemeClr val="accent1"/>
+          </a:effectRef>
+          <a:fontRef idx="minor">
+            <a:schemeClr val="tx1"/>
+          </a:fontRef>
+        </p:style>
+      </p:cxnSp>
+      <p:cxnSp>
+        <p:nvCxnSpPr>
+          <p:cNvPr id="21" name="Straight Connector 20"/>
+          <p:cNvCxnSpPr/>
+          <p:nvPr/>
+        </p:nvCxnSpPr>
+        <p:spPr>
+          <a:xfrm>
+            <a:off x="3638226" y="4144572"/>
+            <a:ext cx="1102569" cy="1530572"/>
+          </a:xfrm>
+          <a:prstGeom prst="line">
+            <a:avLst/>
+          </a:prstGeom>
+          <a:ln w="28575">
+            <a:solidFill>
+              <a:srgbClr val="FF0000"/>
+            </a:solidFill>
+          </a:ln>
+        </p:spPr>
+        <p:style>
+          <a:lnRef idx="1">
+            <a:schemeClr val="accent1"/>
+          </a:lnRef>
+          <a:fillRef idx="0">
+            <a:schemeClr val="accent1"/>
+          </a:fillRef>
+          <a:effectRef idx="0">
+            <a:schemeClr val="accent1"/>
+          </a:effectRef>
+          <a:fontRef idx="minor">
+            <a:schemeClr val="tx1"/>
+          </a:fontRef>
+        </p:style>
+      </p:cxnSp>
+      <p:cxnSp>
+        <p:nvCxnSpPr>
+          <p:cNvPr id="22" name="Straight Connector 21"/>
+          <p:cNvCxnSpPr/>
+          <p:nvPr/>
+        </p:nvCxnSpPr>
+        <p:spPr>
+          <a:xfrm>
+            <a:off x="3528988" y="4141446"/>
+            <a:ext cx="927993" cy="1542752"/>
+          </a:xfrm>
+          <a:prstGeom prst="line">
+            <a:avLst/>
+          </a:prstGeom>
+          <a:ln w="28575">
+            <a:solidFill>
+              <a:srgbClr val="FF0000"/>
+            </a:solidFill>
+          </a:ln>
+        </p:spPr>
+        <p:style>
+          <a:lnRef idx="1">
+            <a:schemeClr val="accent1"/>
+          </a:lnRef>
+          <a:fillRef idx="0">
+            <a:schemeClr val="accent1"/>
+          </a:fillRef>
+          <a:effectRef idx="0">
+            <a:schemeClr val="accent1"/>
+          </a:effectRef>
+          <a:fontRef idx="minor">
+            <a:schemeClr val="tx1"/>
+          </a:fontRef>
+        </p:style>
+      </p:cxnSp>
+      <p:cxnSp>
+        <p:nvCxnSpPr>
+          <p:cNvPr id="23" name="Straight Connector 22"/>
+          <p:cNvCxnSpPr/>
+          <p:nvPr/>
+        </p:nvCxnSpPr>
+        <p:spPr>
+          <a:xfrm>
+            <a:off x="3448617" y="4141446"/>
+            <a:ext cx="683358" cy="1533698"/>
+          </a:xfrm>
+          <a:prstGeom prst="line">
+            <a:avLst/>
+          </a:prstGeom>
+          <a:ln w="28575">
+            <a:solidFill>
+              <a:srgbClr val="FF0000"/>
+            </a:solidFill>
+          </a:ln>
+        </p:spPr>
+        <p:style>
+          <a:lnRef idx="1">
+            <a:schemeClr val="accent1"/>
+          </a:lnRef>
+          <a:fillRef idx="0">
+            <a:schemeClr val="accent1"/>
+          </a:fillRef>
+          <a:effectRef idx="0">
+            <a:schemeClr val="accent1"/>
+          </a:effectRef>
+          <a:fontRef idx="minor">
+            <a:schemeClr val="tx1"/>
+          </a:fontRef>
+        </p:style>
+      </p:cxnSp>
+      <p:cxnSp>
+        <p:nvCxnSpPr>
+          <p:cNvPr id="24" name="Straight Connector 23"/>
+          <p:cNvCxnSpPr/>
+          <p:nvPr/>
+        </p:nvCxnSpPr>
+        <p:spPr>
+          <a:xfrm>
+            <a:off x="3363732" y="4141446"/>
+            <a:ext cx="500485" cy="1542752"/>
+          </a:xfrm>
+          <a:prstGeom prst="line">
+            <a:avLst/>
+          </a:prstGeom>
+          <a:ln w="28575">
+            <a:solidFill>
+              <a:srgbClr val="FF0000"/>
+            </a:solidFill>
+          </a:ln>
+        </p:spPr>
+        <p:style>
+          <a:lnRef idx="1">
+            <a:schemeClr val="accent1"/>
+          </a:lnRef>
+          <a:fillRef idx="0">
+            <a:schemeClr val="accent1"/>
+          </a:fillRef>
+          <a:effectRef idx="0">
+            <a:schemeClr val="accent1"/>
+          </a:effectRef>
+          <a:fontRef idx="minor">
+            <a:schemeClr val="tx1"/>
+          </a:fontRef>
+        </p:style>
+      </p:cxnSp>
+      <p:cxnSp>
+        <p:nvCxnSpPr>
+          <p:cNvPr id="25" name="Straight Connector 24"/>
+          <p:cNvCxnSpPr/>
+          <p:nvPr/>
+        </p:nvCxnSpPr>
+        <p:spPr>
+          <a:xfrm>
+            <a:off x="3267962" y="4141446"/>
+            <a:ext cx="275156" cy="1524405"/>
+          </a:xfrm>
+          <a:prstGeom prst="line">
+            <a:avLst/>
+          </a:prstGeom>
+          <a:ln w="28575">
+            <a:solidFill>
+              <a:srgbClr val="FF0000"/>
+            </a:solidFill>
+          </a:ln>
+        </p:spPr>
+        <p:style>
+          <a:lnRef idx="1">
+            <a:schemeClr val="accent1"/>
+          </a:lnRef>
+          <a:fillRef idx="0">
+            <a:schemeClr val="accent1"/>
+          </a:fillRef>
+          <a:effectRef idx="0">
+            <a:schemeClr val="accent1"/>
+          </a:effectRef>
+          <a:fontRef idx="minor">
+            <a:schemeClr val="tx1"/>
+          </a:fontRef>
+        </p:style>
+      </p:cxnSp>
+      <p:cxnSp>
+        <p:nvCxnSpPr>
+          <p:cNvPr id="26" name="Straight Connector 25"/>
+          <p:cNvCxnSpPr/>
+          <p:nvPr/>
+        </p:nvCxnSpPr>
+        <p:spPr>
+          <a:xfrm>
+            <a:off x="3189773" y="4141446"/>
+            <a:ext cx="70137" cy="1546067"/>
+          </a:xfrm>
+          <a:prstGeom prst="line">
+            <a:avLst/>
+          </a:prstGeom>
+          <a:ln w="28575">
+            <a:solidFill>
+              <a:srgbClr val="FF0000"/>
+            </a:solidFill>
+          </a:ln>
+        </p:spPr>
+        <p:style>
+          <a:lnRef idx="1">
+            <a:schemeClr val="accent1"/>
+          </a:lnRef>
+          <a:fillRef idx="0">
+            <a:schemeClr val="accent1"/>
+          </a:fillRef>
+          <a:effectRef idx="0">
+            <a:schemeClr val="accent1"/>
+          </a:effectRef>
+          <a:fontRef idx="minor">
+            <a:schemeClr val="tx1"/>
+          </a:fontRef>
+        </p:style>
+      </p:cxnSp>
+      <p:cxnSp>
+        <p:nvCxnSpPr>
+          <p:cNvPr id="27" name="Straight Connector 26"/>
+          <p:cNvCxnSpPr/>
+          <p:nvPr/>
+        </p:nvCxnSpPr>
+        <p:spPr>
+          <a:xfrm flipH="1">
+            <a:off x="2964665" y="4150801"/>
+            <a:ext cx="148231" cy="1524341"/>
+          </a:xfrm>
+          <a:prstGeom prst="line">
+            <a:avLst/>
+          </a:prstGeom>
+          <a:ln w="28575">
+            <a:solidFill>
+              <a:srgbClr val="FF0000"/>
+            </a:solidFill>
+          </a:ln>
+        </p:spPr>
+        <p:style>
+          <a:lnRef idx="1">
+            <a:schemeClr val="accent1"/>
+          </a:lnRef>
+          <a:fillRef idx="0">
+            <a:schemeClr val="accent1"/>
+          </a:fillRef>
+          <a:effectRef idx="0">
+            <a:schemeClr val="accent1"/>
+          </a:effectRef>
+          <a:fontRef idx="minor">
+            <a:schemeClr val="tx1"/>
+          </a:fontRef>
+        </p:style>
+      </p:cxnSp>
+      <p:cxnSp>
+        <p:nvCxnSpPr>
+          <p:cNvPr id="28" name="Straight Connector 27"/>
+          <p:cNvCxnSpPr/>
+          <p:nvPr/>
+        </p:nvCxnSpPr>
+        <p:spPr>
+          <a:xfrm flipH="1">
+            <a:off x="2362721" y="4150801"/>
+            <a:ext cx="654405" cy="1524341"/>
+          </a:xfrm>
+          <a:prstGeom prst="line">
+            <a:avLst/>
+          </a:prstGeom>
+          <a:ln w="28575">
+            <a:solidFill>
+              <a:srgbClr val="FF0000"/>
+            </a:solidFill>
+          </a:ln>
+        </p:spPr>
+        <p:style>
+          <a:lnRef idx="1">
+            <a:schemeClr val="accent1"/>
+          </a:lnRef>
+          <a:fillRef idx="0">
+            <a:schemeClr val="accent1"/>
+          </a:fillRef>
+          <a:effectRef idx="0">
+            <a:schemeClr val="accent1"/>
+          </a:effectRef>
+          <a:fontRef idx="minor">
+            <a:schemeClr val="tx1"/>
+          </a:fontRef>
+        </p:style>
+      </p:cxnSp>
+      <p:cxnSp>
+        <p:nvCxnSpPr>
+          <p:cNvPr id="29" name="Straight Connector 28"/>
+          <p:cNvCxnSpPr/>
+          <p:nvPr/>
+        </p:nvCxnSpPr>
+        <p:spPr>
+          <a:xfrm flipH="1">
+            <a:off x="2074329" y="4141446"/>
+            <a:ext cx="855490" cy="1521278"/>
+          </a:xfrm>
+          <a:prstGeom prst="line">
+            <a:avLst/>
+          </a:prstGeom>
+          <a:ln w="28575">
+            <a:solidFill>
+              <a:srgbClr val="FF0000"/>
+            </a:solidFill>
+          </a:ln>
+        </p:spPr>
+        <p:style>
+          <a:lnRef idx="1">
+            <a:schemeClr val="accent1"/>
+          </a:lnRef>
+          <a:fillRef idx="0">
+            <a:schemeClr val="accent1"/>
+          </a:fillRef>
+          <a:effectRef idx="0">
+            <a:schemeClr val="accent1"/>
+          </a:effectRef>
+          <a:fontRef idx="minor">
+            <a:schemeClr val="tx1"/>
+          </a:fontRef>
+        </p:style>
+      </p:cxnSp>
+      <p:cxnSp>
+        <p:nvCxnSpPr>
+          <p:cNvPr id="30" name="Straight Connector 29"/>
+          <p:cNvCxnSpPr/>
+          <p:nvPr/>
+        </p:nvCxnSpPr>
+        <p:spPr>
+          <a:xfrm flipH="1">
+            <a:off x="1771725" y="4150801"/>
+            <a:ext cx="890336" cy="1524341"/>
+          </a:xfrm>
+          <a:prstGeom prst="line">
+            <a:avLst/>
+          </a:prstGeom>
+          <a:ln w="28575">
+            <a:solidFill>
+              <a:srgbClr val="FF0000"/>
+            </a:solidFill>
+          </a:ln>
+        </p:spPr>
+        <p:style>
+          <a:lnRef idx="1">
+            <a:schemeClr val="accent1"/>
+          </a:lnRef>
+          <a:fillRef idx="0">
+            <a:schemeClr val="accent1"/>
+          </a:fillRef>
+          <a:effectRef idx="0">
+            <a:schemeClr val="accent1"/>
+          </a:effectRef>
+          <a:fontRef idx="minor">
+            <a:schemeClr val="tx1"/>
+          </a:fontRef>
+        </p:style>
+      </p:cxnSp>
+      <p:cxnSp>
+        <p:nvCxnSpPr>
+          <p:cNvPr id="31" name="Straight Connector 30"/>
+          <p:cNvCxnSpPr/>
+          <p:nvPr/>
+        </p:nvCxnSpPr>
+        <p:spPr>
+          <a:xfrm flipH="1">
+            <a:off x="1507458" y="4141446"/>
+            <a:ext cx="1076288" cy="1514320"/>
+          </a:xfrm>
+          <a:prstGeom prst="line">
+            <a:avLst/>
+          </a:prstGeom>
+          <a:ln w="28575">
+            <a:solidFill>
+              <a:srgbClr val="FF0000"/>
+            </a:solidFill>
+          </a:ln>
+        </p:spPr>
+        <p:style>
+          <a:lnRef idx="1">
+            <a:schemeClr val="accent1"/>
+          </a:lnRef>
+          <a:fillRef idx="0">
+            <a:schemeClr val="accent1"/>
+          </a:fillRef>
+          <a:effectRef idx="0">
+            <a:schemeClr val="accent1"/>
+          </a:effectRef>
+          <a:fontRef idx="minor">
+            <a:schemeClr val="tx1"/>
+          </a:fontRef>
+        </p:style>
+      </p:cxnSp>
+      <p:cxnSp>
+        <p:nvCxnSpPr>
+          <p:cNvPr id="32" name="Straight Connector 31"/>
+          <p:cNvCxnSpPr/>
+          <p:nvPr/>
+        </p:nvCxnSpPr>
+        <p:spPr>
+          <a:xfrm flipH="1">
+            <a:off x="1187135" y="4150801"/>
+            <a:ext cx="1317802" cy="1504965"/>
+          </a:xfrm>
+          <a:prstGeom prst="line">
+            <a:avLst/>
+          </a:prstGeom>
+          <a:ln w="28575">
+            <a:solidFill>
+              <a:srgbClr val="FF0000"/>
+            </a:solidFill>
+          </a:ln>
+        </p:spPr>
+        <p:style>
+          <a:lnRef idx="1">
+            <a:schemeClr val="accent1"/>
+          </a:lnRef>
+          <a:fillRef idx="0">
+            <a:schemeClr val="accent1"/>
+          </a:fillRef>
+          <a:effectRef idx="0">
+            <a:schemeClr val="accent1"/>
+          </a:effectRef>
+          <a:fontRef idx="minor">
+            <a:schemeClr val="tx1"/>
+          </a:fontRef>
+        </p:style>
+      </p:cxnSp>
+      <p:cxnSp>
+        <p:nvCxnSpPr>
+          <p:cNvPr id="33" name="Straight Connector 32"/>
+          <p:cNvCxnSpPr/>
+          <p:nvPr/>
+        </p:nvCxnSpPr>
+        <p:spPr>
+          <a:xfrm flipH="1">
+            <a:off x="857375" y="4058464"/>
+            <a:ext cx="1570667" cy="1039487"/>
+          </a:xfrm>
+          <a:prstGeom prst="line">
+            <a:avLst/>
+          </a:prstGeom>
+          <a:ln w="28575">
+            <a:solidFill>
+              <a:srgbClr val="FF0000"/>
+            </a:solidFill>
+          </a:ln>
+        </p:spPr>
+        <p:style>
+          <a:lnRef idx="1">
+            <a:schemeClr val="accent1"/>
+          </a:lnRef>
+          <a:fillRef idx="0">
+            <a:schemeClr val="accent1"/>
+          </a:fillRef>
+          <a:effectRef idx="0">
+            <a:schemeClr val="accent1"/>
+          </a:effectRef>
+          <a:fontRef idx="minor">
+            <a:schemeClr val="tx1"/>
+          </a:fontRef>
+        </p:style>
+      </p:cxnSp>
+      <p:cxnSp>
+        <p:nvCxnSpPr>
+          <p:cNvPr id="34" name="Straight Connector 33"/>
+          <p:cNvCxnSpPr/>
+          <p:nvPr/>
+        </p:nvCxnSpPr>
+        <p:spPr>
+          <a:xfrm flipH="1">
+            <a:off x="857375" y="3981388"/>
+            <a:ext cx="1578718" cy="832196"/>
+          </a:xfrm>
+          <a:prstGeom prst="line">
+            <a:avLst/>
+          </a:prstGeom>
+          <a:ln w="28575">
+            <a:solidFill>
+              <a:srgbClr val="FF0000"/>
+            </a:solidFill>
+          </a:ln>
+        </p:spPr>
+        <p:style>
+          <a:lnRef idx="1">
+            <a:schemeClr val="accent1"/>
+          </a:lnRef>
+          <a:fillRef idx="0">
+            <a:schemeClr val="accent1"/>
+          </a:fillRef>
+          <a:effectRef idx="0">
+            <a:schemeClr val="accent1"/>
+          </a:effectRef>
+          <a:fontRef idx="minor">
+            <a:schemeClr val="tx1"/>
+          </a:fontRef>
+        </p:style>
+      </p:cxnSp>
+      <p:cxnSp>
+        <p:nvCxnSpPr>
+          <p:cNvPr id="35" name="Straight Connector 34"/>
+          <p:cNvCxnSpPr/>
+          <p:nvPr/>
+        </p:nvCxnSpPr>
+        <p:spPr>
+          <a:xfrm flipH="1">
+            <a:off x="857375" y="3728286"/>
+            <a:ext cx="1555153" cy="493998"/>
+          </a:xfrm>
+          <a:prstGeom prst="line">
+            <a:avLst/>
+          </a:prstGeom>
+          <a:ln w="28575">
+            <a:solidFill>
+              <a:srgbClr val="FF0000"/>
+            </a:solidFill>
+          </a:ln>
+        </p:spPr>
+        <p:style>
+          <a:lnRef idx="1">
+            <a:schemeClr val="accent1"/>
+          </a:lnRef>
+          <a:fillRef idx="0">
+            <a:schemeClr val="accent1"/>
+          </a:fillRef>
+          <a:effectRef idx="0">
+            <a:schemeClr val="accent1"/>
+          </a:effectRef>
+          <a:fontRef idx="minor">
+            <a:schemeClr val="tx1"/>
+          </a:fontRef>
+        </p:style>
+      </p:cxnSp>
+      <p:cxnSp>
+        <p:nvCxnSpPr>
+          <p:cNvPr id="36" name="Straight Connector 35"/>
+          <p:cNvCxnSpPr/>
+          <p:nvPr/>
+        </p:nvCxnSpPr>
+        <p:spPr>
+          <a:xfrm flipH="1" flipV="1">
+            <a:off x="858248" y="1498803"/>
+            <a:ext cx="1569792" cy="1339031"/>
+          </a:xfrm>
+          <a:prstGeom prst="line">
+            <a:avLst/>
+          </a:prstGeom>
+          <a:ln w="28575">
+            <a:solidFill>
+              <a:srgbClr val="FF0000"/>
+            </a:solidFill>
+          </a:ln>
+        </p:spPr>
+        <p:style>
+          <a:lnRef idx="1">
+            <a:schemeClr val="accent1"/>
+          </a:lnRef>
+          <a:fillRef idx="0">
+            <a:schemeClr val="accent1"/>
+          </a:fillRef>
+          <a:effectRef idx="0">
+            <a:schemeClr val="accent1"/>
+          </a:effectRef>
+          <a:fontRef idx="minor">
+            <a:schemeClr val="tx1"/>
+          </a:fontRef>
+        </p:style>
+      </p:cxnSp>
+      <p:cxnSp>
+        <p:nvCxnSpPr>
+          <p:cNvPr id="37" name="Straight Connector 36"/>
+          <p:cNvCxnSpPr/>
+          <p:nvPr/>
+        </p:nvCxnSpPr>
+        <p:spPr>
+          <a:xfrm flipH="1" flipV="1">
+            <a:off x="872890" y="1814815"/>
+            <a:ext cx="1539635" cy="1115359"/>
+          </a:xfrm>
+          <a:prstGeom prst="line">
+            <a:avLst/>
+          </a:prstGeom>
+          <a:ln w="28575">
+            <a:solidFill>
+              <a:srgbClr val="FF0000"/>
+            </a:solidFill>
+          </a:ln>
+        </p:spPr>
+        <p:style>
+          <a:lnRef idx="1">
+            <a:schemeClr val="accent1"/>
+          </a:lnRef>
+          <a:fillRef idx="0">
+            <a:schemeClr val="accent1"/>
+          </a:fillRef>
+          <a:effectRef idx="0">
+            <a:schemeClr val="accent1"/>
+          </a:effectRef>
+          <a:fontRef idx="minor">
+            <a:schemeClr val="tx1"/>
+          </a:fontRef>
+        </p:style>
+      </p:cxnSp>
+      <p:cxnSp>
+        <p:nvCxnSpPr>
+          <p:cNvPr id="38" name="Straight Connector 37"/>
+          <p:cNvCxnSpPr/>
+          <p:nvPr/>
+        </p:nvCxnSpPr>
+        <p:spPr>
+          <a:xfrm flipH="1" flipV="1">
+            <a:off x="872890" y="2391825"/>
+            <a:ext cx="1554278" cy="896061"/>
+          </a:xfrm>
+          <a:prstGeom prst="line">
+            <a:avLst/>
+          </a:prstGeom>
+          <a:ln w="28575">
+            <a:solidFill>
+              <a:srgbClr val="FF0000"/>
+            </a:solidFill>
+          </a:ln>
+        </p:spPr>
+        <p:style>
+          <a:lnRef idx="1">
+            <a:schemeClr val="accent1"/>
+          </a:lnRef>
+          <a:fillRef idx="0">
+            <a:schemeClr val="accent1"/>
+          </a:fillRef>
+          <a:effectRef idx="0">
+            <a:schemeClr val="accent1"/>
+          </a:effectRef>
+          <a:fontRef idx="minor">
+            <a:schemeClr val="tx1"/>
+          </a:fontRef>
+        </p:style>
+      </p:cxnSp>
+      <p:cxnSp>
+        <p:nvCxnSpPr>
+          <p:cNvPr id="39" name="Straight Connector 38"/>
+          <p:cNvCxnSpPr/>
+          <p:nvPr/>
+        </p:nvCxnSpPr>
+        <p:spPr>
+          <a:xfrm flipH="1" flipV="1">
+            <a:off x="857375" y="3007249"/>
+            <a:ext cx="1578718" cy="479941"/>
+          </a:xfrm>
+          <a:prstGeom prst="line">
+            <a:avLst/>
+          </a:prstGeom>
+          <a:ln w="28575">
+            <a:solidFill>
+              <a:srgbClr val="FF0000"/>
+            </a:solidFill>
+          </a:ln>
+        </p:spPr>
+        <p:style>
+          <a:lnRef idx="1">
+            <a:schemeClr val="accent1"/>
+          </a:lnRef>
+          <a:fillRef idx="0">
+            <a:schemeClr val="accent1"/>
+          </a:fillRef>
+          <a:effectRef idx="0">
+            <a:schemeClr val="accent1"/>
+          </a:effectRef>
+          <a:fontRef idx="minor">
+            <a:schemeClr val="tx1"/>
+          </a:fontRef>
+        </p:style>
+      </p:cxnSp>
+      <p:cxnSp>
+        <p:nvCxnSpPr>
+          <p:cNvPr id="40" name="Straight Connector 39"/>
+          <p:cNvCxnSpPr/>
+          <p:nvPr/>
+        </p:nvCxnSpPr>
+        <p:spPr>
+          <a:xfrm flipH="1" flipV="1">
+            <a:off x="842732" y="3332035"/>
+            <a:ext cx="1593360" cy="208955"/>
+          </a:xfrm>
+          <a:prstGeom prst="line">
+            <a:avLst/>
+          </a:prstGeom>
+          <a:ln w="28575">
+            <a:solidFill>
+              <a:srgbClr val="FF0000"/>
+            </a:solidFill>
+          </a:ln>
+        </p:spPr>
+        <p:style>
+          <a:lnRef idx="1">
+            <a:schemeClr val="accent1"/>
+          </a:lnRef>
+          <a:fillRef idx="0">
+            <a:schemeClr val="accent1"/>
+          </a:fillRef>
+          <a:effectRef idx="0">
+            <a:schemeClr val="accent1"/>
+          </a:effectRef>
+          <a:fontRef idx="minor">
+            <a:schemeClr val="tx1"/>
+          </a:fontRef>
+        </p:style>
+      </p:cxnSp>
+      <p:cxnSp>
+        <p:nvCxnSpPr>
+          <p:cNvPr id="41" name="Straight Connector 40"/>
+          <p:cNvCxnSpPr/>
+          <p:nvPr/>
+        </p:nvCxnSpPr>
+        <p:spPr>
+          <a:xfrm flipH="1" flipV="1">
+            <a:off x="834450" y="3606292"/>
+            <a:ext cx="1584307" cy="29656"/>
+          </a:xfrm>
+          <a:prstGeom prst="line">
+            <a:avLst/>
+          </a:prstGeom>
+          <a:ln w="28575">
+            <a:solidFill>
+              <a:srgbClr val="FF0000"/>
+            </a:solidFill>
+          </a:ln>
+        </p:spPr>
+        <p:style>
+          <a:lnRef idx="1">
+            <a:schemeClr val="accent1"/>
+          </a:lnRef>
+          <a:fillRef idx="0">
+            <a:schemeClr val="accent1"/>
+          </a:fillRef>
+          <a:effectRef idx="0">
+            <a:schemeClr val="accent1"/>
+          </a:effectRef>
+          <a:fontRef idx="minor">
+            <a:schemeClr val="tx1"/>
+          </a:fontRef>
+        </p:style>
+      </p:cxnSp>
+      <p:cxnSp>
+        <p:nvCxnSpPr>
+          <p:cNvPr id="42" name="Straight Connector 41"/>
+          <p:cNvCxnSpPr/>
+          <p:nvPr/>
+        </p:nvCxnSpPr>
+        <p:spPr>
+          <a:xfrm flipH="1" flipV="1">
+            <a:off x="1147092" y="1187669"/>
+            <a:ext cx="1357843" cy="1591033"/>
+          </a:xfrm>
+          <a:prstGeom prst="line">
+            <a:avLst/>
+          </a:prstGeom>
+          <a:ln w="28575">
+            <a:solidFill>
+              <a:srgbClr val="FF0000"/>
+            </a:solidFill>
+          </a:ln>
+        </p:spPr>
+        <p:style>
+          <a:lnRef idx="1">
+            <a:schemeClr val="accent1"/>
+          </a:lnRef>
+          <a:fillRef idx="0">
+            <a:schemeClr val="accent1"/>
+          </a:fillRef>
+          <a:effectRef idx="0">
+            <a:schemeClr val="accent1"/>
+          </a:effectRef>
+          <a:fontRef idx="minor">
+            <a:schemeClr val="tx1"/>
+          </a:fontRef>
+        </p:style>
+      </p:cxnSp>
+      <p:cxnSp>
+        <p:nvCxnSpPr>
+          <p:cNvPr id="43" name="Straight Connector 42"/>
+          <p:cNvCxnSpPr/>
+          <p:nvPr/>
+        </p:nvCxnSpPr>
+        <p:spPr>
+          <a:xfrm flipH="1" flipV="1">
+            <a:off x="1721840" y="1187669"/>
+            <a:ext cx="1057298" cy="1581614"/>
+          </a:xfrm>
+          <a:prstGeom prst="line">
+            <a:avLst/>
+          </a:prstGeom>
+          <a:ln w="28575">
+            <a:solidFill>
+              <a:srgbClr val="FF0000"/>
+            </a:solidFill>
+          </a:ln>
+        </p:spPr>
+        <p:style>
+          <a:lnRef idx="1">
+            <a:schemeClr val="accent1"/>
+          </a:lnRef>
+          <a:fillRef idx="0">
+            <a:schemeClr val="accent1"/>
+          </a:fillRef>
+          <a:effectRef idx="0">
+            <a:schemeClr val="accent1"/>
+          </a:effectRef>
+          <a:fontRef idx="minor">
+            <a:schemeClr val="tx1"/>
+          </a:fontRef>
+        </p:style>
+      </p:cxnSp>
+      <p:cxnSp>
+        <p:nvCxnSpPr>
+          <p:cNvPr id="44" name="Straight Connector 43"/>
+          <p:cNvCxnSpPr/>
+          <p:nvPr/>
+        </p:nvCxnSpPr>
+        <p:spPr>
+          <a:xfrm flipH="1" flipV="1">
+            <a:off x="2074328" y="1212350"/>
+            <a:ext cx="783292" cy="1561643"/>
+          </a:xfrm>
+          <a:prstGeom prst="line">
+            <a:avLst/>
+          </a:prstGeom>
+          <a:ln w="28575">
+            <a:solidFill>
+              <a:srgbClr val="FF0000"/>
+            </a:solidFill>
+          </a:ln>
+        </p:spPr>
+        <p:style>
+          <a:lnRef idx="1">
+            <a:schemeClr val="accent1"/>
+          </a:lnRef>
+          <a:fillRef idx="0">
+            <a:schemeClr val="accent1"/>
+          </a:fillRef>
+          <a:effectRef idx="0">
+            <a:schemeClr val="accent1"/>
+          </a:effectRef>
+          <a:fontRef idx="minor">
+            <a:schemeClr val="tx1"/>
+          </a:fontRef>
+        </p:style>
+      </p:cxnSp>
+      <p:cxnSp>
+        <p:nvCxnSpPr>
+          <p:cNvPr id="45" name="Straight Connector 44"/>
+          <p:cNvCxnSpPr/>
+          <p:nvPr/>
+        </p:nvCxnSpPr>
+        <p:spPr>
+          <a:xfrm flipV="1">
+            <a:off x="3638226" y="1212350"/>
+            <a:ext cx="1410257" cy="1551296"/>
+          </a:xfrm>
+          <a:prstGeom prst="line">
+            <a:avLst/>
+          </a:prstGeom>
+          <a:ln w="28575">
+            <a:solidFill>
+              <a:srgbClr val="FF0000"/>
+            </a:solidFill>
+          </a:ln>
+        </p:spPr>
+        <p:style>
+          <a:lnRef idx="1">
+            <a:schemeClr val="accent1"/>
+          </a:lnRef>
+          <a:fillRef idx="0">
+            <a:schemeClr val="accent1"/>
+          </a:fillRef>
+          <a:effectRef idx="0">
+            <a:schemeClr val="accent1"/>
+          </a:effectRef>
+          <a:fontRef idx="minor">
+            <a:schemeClr val="tx1"/>
+          </a:fontRef>
+        </p:style>
+      </p:cxnSp>
+      <p:cxnSp>
+        <p:nvCxnSpPr>
+          <p:cNvPr id="46" name="Straight Connector 45"/>
+          <p:cNvCxnSpPr/>
+          <p:nvPr/>
+        </p:nvCxnSpPr>
+        <p:spPr>
+          <a:xfrm flipV="1">
+            <a:off x="3448616" y="1218834"/>
+            <a:ext cx="993342" cy="1559869"/>
+          </a:xfrm>
+          <a:prstGeom prst="line">
+            <a:avLst/>
+          </a:prstGeom>
+          <a:ln w="28575">
+            <a:solidFill>
+              <a:srgbClr val="FF0000"/>
+            </a:solidFill>
+          </a:ln>
+        </p:spPr>
+        <p:style>
+          <a:lnRef idx="1">
+            <a:schemeClr val="accent1"/>
+          </a:lnRef>
+          <a:fillRef idx="0">
+            <a:schemeClr val="accent1"/>
+          </a:fillRef>
+          <a:effectRef idx="0">
+            <a:schemeClr val="accent1"/>
+          </a:effectRef>
+          <a:fontRef idx="minor">
+            <a:schemeClr val="tx1"/>
+          </a:fontRef>
+        </p:style>
+      </p:cxnSp>
+      <p:cxnSp>
+        <p:nvCxnSpPr>
+          <p:cNvPr id="47" name="Straight Connector 46"/>
+          <p:cNvCxnSpPr/>
+          <p:nvPr/>
+        </p:nvCxnSpPr>
+        <p:spPr>
+          <a:xfrm flipV="1">
+            <a:off x="3363729" y="1212350"/>
+            <a:ext cx="785178" cy="1554422"/>
+          </a:xfrm>
+          <a:prstGeom prst="line">
+            <a:avLst/>
+          </a:prstGeom>
+          <a:ln w="28575">
+            <a:solidFill>
+              <a:srgbClr val="FF0000"/>
+            </a:solidFill>
+          </a:ln>
+        </p:spPr>
+        <p:style>
+          <a:lnRef idx="1">
+            <a:schemeClr val="accent1"/>
+          </a:lnRef>
+          <a:fillRef idx="0">
+            <a:schemeClr val="accent1"/>
+          </a:fillRef>
+          <a:effectRef idx="0">
+            <a:schemeClr val="accent1"/>
+          </a:effectRef>
+          <a:fontRef idx="minor">
+            <a:schemeClr val="tx1"/>
+          </a:fontRef>
+        </p:style>
+      </p:cxnSp>
+      <p:cxnSp>
+        <p:nvCxnSpPr>
+          <p:cNvPr id="48" name="Straight Connector 47"/>
+          <p:cNvCxnSpPr/>
+          <p:nvPr/>
+        </p:nvCxnSpPr>
+        <p:spPr>
+          <a:xfrm flipV="1">
+            <a:off x="3297911" y="1182833"/>
+            <a:ext cx="270724" cy="1589997"/>
+          </a:xfrm>
+          <a:prstGeom prst="line">
+            <a:avLst/>
+          </a:prstGeom>
+          <a:ln w="28575">
+            <a:solidFill>
+              <a:srgbClr val="FF0000"/>
+            </a:solidFill>
+          </a:ln>
+        </p:spPr>
+        <p:style>
+          <a:lnRef idx="1">
+            <a:schemeClr val="accent1"/>
+          </a:lnRef>
+          <a:fillRef idx="0">
+            <a:schemeClr val="accent1"/>
+          </a:fillRef>
+          <a:effectRef idx="0">
+            <a:schemeClr val="accent1"/>
+          </a:effectRef>
+          <a:fontRef idx="minor">
+            <a:schemeClr val="tx1"/>
+          </a:fontRef>
+        </p:style>
+      </p:cxnSp>
+      <p:cxnSp>
+        <p:nvCxnSpPr>
+          <p:cNvPr id="49" name="Straight Connector 48"/>
+          <p:cNvCxnSpPr/>
+          <p:nvPr/>
+        </p:nvCxnSpPr>
+        <p:spPr>
+          <a:xfrm flipH="1" flipV="1">
+            <a:off x="2978023" y="1182833"/>
+            <a:ext cx="220660" cy="1589999"/>
+          </a:xfrm>
+          <a:prstGeom prst="line">
+            <a:avLst/>
+          </a:prstGeom>
+          <a:ln w="28575">
+            <a:solidFill>
+              <a:srgbClr val="FF0000"/>
+            </a:solidFill>
+          </a:ln>
+        </p:spPr>
+        <p:style>
+          <a:lnRef idx="1">
+            <a:schemeClr val="accent1"/>
+          </a:lnRef>
+          <a:fillRef idx="0">
+            <a:schemeClr val="accent1"/>
+          </a:fillRef>
+          <a:effectRef idx="0">
+            <a:schemeClr val="accent1"/>
+          </a:effectRef>
+          <a:fontRef idx="minor">
+            <a:schemeClr val="tx1"/>
+          </a:fontRef>
+        </p:style>
+      </p:cxnSp>
+      <p:cxnSp>
+        <p:nvCxnSpPr>
+          <p:cNvPr id="50" name="Straight Connector 49"/>
+          <p:cNvCxnSpPr/>
+          <p:nvPr/>
+        </p:nvCxnSpPr>
+        <p:spPr>
+          <a:xfrm flipH="1" flipV="1">
+            <a:off x="2658943" y="1159340"/>
+            <a:ext cx="453308" cy="1628006"/>
+          </a:xfrm>
+          <a:prstGeom prst="line">
+            <a:avLst/>
+          </a:prstGeom>
+          <a:ln w="28575">
+            <a:solidFill>
+              <a:srgbClr val="FF0000"/>
+            </a:solidFill>
+          </a:ln>
+        </p:spPr>
+        <p:style>
+          <a:lnRef idx="1">
+            <a:schemeClr val="accent1"/>
+          </a:lnRef>
+          <a:fillRef idx="0">
+            <a:schemeClr val="accent1"/>
+          </a:fillRef>
+          <a:effectRef idx="0">
+            <a:schemeClr val="accent1"/>
+          </a:effectRef>
+          <a:fontRef idx="minor">
+            <a:schemeClr val="tx1"/>
+          </a:fontRef>
+        </p:style>
+      </p:cxnSp>
+      <p:pic>
+        <p:nvPicPr>
+          <p:cNvPr id="51" name="Picture 50"/>
+          <p:cNvPicPr>
+            <a:picLocks noChangeAspect="1"/>
+          </p:cNvPicPr>
+          <p:nvPr/>
+        </p:nvPicPr>
+        <p:blipFill>
+          <a:blip r:embed="rId3"/>
+          <a:stretch>
+            <a:fillRect/>
+          </a:stretch>
+        </p:blipFill>
+        <p:spPr>
+          <a:xfrm>
+            <a:off x="6807228" y="1428996"/>
+            <a:ext cx="4116388" cy="4116388"/>
+          </a:xfrm>
+          <a:prstGeom prst="rect">
+            <a:avLst/>
+          </a:prstGeom>
+        </p:spPr>
+      </p:pic>
+      <p:sp>
+        <p:nvSpPr>
+          <p:cNvPr id="4" name="TextBox 3"/>
+          <p:cNvSpPr txBox="1"/>
+          <p:nvPr/>
+        </p:nvSpPr>
+        <p:spPr>
+          <a:xfrm>
+            <a:off x="8286750" y="849502"/>
+            <a:ext cx="1407758" cy="369332"/>
+          </a:xfrm>
+          <a:prstGeom prst="rect">
+            <a:avLst/>
+          </a:prstGeom>
+          <a:noFill/>
+        </p:spPr>
+        <p:txBody>
+          <a:bodyPr wrap="none" rtlCol="0">
+            <a:spAutoFit/>
+          </a:bodyPr>
+          <a:lstStyle/>
+          <a:p>
+            <a:r>
+              <a:rPr lang="en-US" dirty="0" smtClean="0">
+                <a:latin typeface="Arial Narrow" panose="020B0606020202030204" pitchFamily="34" charset="0"/>
+              </a:rPr>
+              <a:t>Die orientation</a:t>
+            </a:r>
+            <a:endParaRPr lang="en-US" dirty="0">
+              <a:latin typeface="Arial Narrow" panose="020B0606020202030204" pitchFamily="34" charset="0"/>
+            </a:endParaRPr>
+          </a:p>
+        </p:txBody>
+      </p:sp>
     </p:spTree>
     <p:extLst>
       <p:ext uri="{BB962C8B-B14F-4D97-AF65-F5344CB8AC3E}">
-        <p14:creationId xmlns:p14="http://schemas.microsoft.com/office/powerpoint/2010/main" val="1083489588"/>
+        <p14:creationId xmlns:p14="http://schemas.microsoft.com/office/powerpoint/2010/main" val="580236707"/>
       </p:ext>
     </p:extLst>
   </p:cSld>

</xml_diff>